<commit_message>
lec8 - updated slides.
</commit_message>
<xml_diff>
--- a/lectures/lecture-6-7-8/Lecture_8_ER.pptx
+++ b/lectures/lecture-6-7-8/Lecture_8_ER.pptx
@@ -5,7 +5,7 @@
     <p:sldMasterId id="2147483648" r:id="rId1"/>
   </p:sldMasterIdLst>
   <p:notesMasterIdLst>
-    <p:notesMasterId r:id="rId25"/>
+    <p:notesMasterId r:id="rId29"/>
   </p:notesMasterIdLst>
   <p:sldIdLst>
     <p:sldId id="256" r:id="rId2"/>
@@ -31,6 +31,10 @@
     <p:sldId id="331" r:id="rId22"/>
     <p:sldId id="358" r:id="rId23"/>
     <p:sldId id="333" r:id="rId24"/>
+    <p:sldId id="359" r:id="rId25"/>
+    <p:sldId id="360" r:id="rId26"/>
+    <p:sldId id="361" r:id="rId27"/>
+    <p:sldId id="362" r:id="rId28"/>
   </p:sldIdLst>
   <p:sldSz cx="12192000" cy="6858000"/>
   <p:notesSz cx="6858000" cy="9144000"/>
@@ -131,7 +135,7 @@
   </p:defaultTextStyle>
   <p:extLst>
     <p:ext uri="{EFAFB233-063F-42B5-8137-9DF3F51BA10A}">
-      <p15:sldGuideLst xmlns="" xmlns:p15="http://schemas.microsoft.com/office/powerpoint/2012/main">
+      <p15:sldGuideLst xmlns:p15="http://schemas.microsoft.com/office/powerpoint/2012/main" xmlns="">
         <p15:guide id="1" orient="horz" pos="2160">
           <p15:clr>
             <a:srgbClr val="A4A3A4"/>
@@ -747,6 +751,174 @@
     <p:extLst>
       <p:ext uri="{BB962C8B-B14F-4D97-AF65-F5344CB8AC3E}">
         <p14:creationId xmlns:p14="http://schemas.microsoft.com/office/powerpoint/2010/main" val="3735014867"/>
+      </p:ext>
+    </p:extLst>
+  </p:cSld>
+  <p:clrMapOvr>
+    <a:masterClrMapping/>
+  </p:clrMapOvr>
+</p:notes>
+</file>
+
+<file path=ppt/notesSlides/notesSlide4.xml><?xml version="1.0" encoding="utf-8"?>
+<p:notes xmlns:a="http://schemas.openxmlformats.org/drawingml/2006/main" xmlns:r="http://schemas.openxmlformats.org/officeDocument/2006/relationships" xmlns:p="http://schemas.openxmlformats.org/presentationml/2006/main">
+  <p:cSld>
+    <p:spTree>
+      <p:nvGrpSpPr>
+        <p:cNvPr id="1" name=""/>
+        <p:cNvGrpSpPr/>
+        <p:nvPr/>
+      </p:nvGrpSpPr>
+      <p:grpSpPr>
+        <a:xfrm>
+          <a:off x="0" y="0"/>
+          <a:ext cx="0" cy="0"/>
+          <a:chOff x="0" y="0"/>
+          <a:chExt cx="0" cy="0"/>
+        </a:xfrm>
+      </p:grpSpPr>
+      <p:sp>
+        <p:nvSpPr>
+          <p:cNvPr id="2" name="Slide Image Placeholder 1"/>
+          <p:cNvSpPr>
+            <a:spLocks noGrp="1" noRot="1" noChangeAspect="1"/>
+          </p:cNvSpPr>
+          <p:nvPr>
+            <p:ph type="sldImg"/>
+          </p:nvPr>
+        </p:nvSpPr>
+        <p:spPr/>
+      </p:sp>
+      <p:sp>
+        <p:nvSpPr>
+          <p:cNvPr id="3" name="Notes Placeholder 2"/>
+          <p:cNvSpPr>
+            <a:spLocks noGrp="1"/>
+          </p:cNvSpPr>
+          <p:nvPr>
+            <p:ph type="body" idx="1"/>
+          </p:nvPr>
+        </p:nvSpPr>
+        <p:spPr/>
+        <p:txBody>
+          <a:bodyPr/>
+          <a:lstStyle/>
+          <a:p>
+            <a:endParaRPr lang="en-US" dirty="0"/>
+          </a:p>
+        </p:txBody>
+      </p:sp>
+      <p:sp>
+        <p:nvSpPr>
+          <p:cNvPr id="4" name="Slide Number Placeholder 3"/>
+          <p:cNvSpPr>
+            <a:spLocks noGrp="1"/>
+          </p:cNvSpPr>
+          <p:nvPr>
+            <p:ph type="sldNum" sz="quarter" idx="10"/>
+          </p:nvPr>
+        </p:nvSpPr>
+        <p:spPr/>
+        <p:txBody>
+          <a:bodyPr/>
+          <a:lstStyle/>
+          <a:p>
+            <a:fld id="{98849DEF-8BE0-8849-BA6F-4200DC94CA5B}" type="slidenum">
+              <a:rPr lang="en-US" smtClean="0"/>
+              <a:t>26</a:t>
+            </a:fld>
+            <a:endParaRPr lang="en-US"/>
+          </a:p>
+        </p:txBody>
+      </p:sp>
+    </p:spTree>
+    <p:extLst>
+      <p:ext uri="{BB962C8B-B14F-4D97-AF65-F5344CB8AC3E}">
+        <p14:creationId xmlns:p14="http://schemas.microsoft.com/office/powerpoint/2010/main" val="1224502944"/>
+      </p:ext>
+    </p:extLst>
+  </p:cSld>
+  <p:clrMapOvr>
+    <a:masterClrMapping/>
+  </p:clrMapOvr>
+</p:notes>
+</file>
+
+<file path=ppt/notesSlides/notesSlide5.xml><?xml version="1.0" encoding="utf-8"?>
+<p:notes xmlns:a="http://schemas.openxmlformats.org/drawingml/2006/main" xmlns:r="http://schemas.openxmlformats.org/officeDocument/2006/relationships" xmlns:p="http://schemas.openxmlformats.org/presentationml/2006/main">
+  <p:cSld>
+    <p:spTree>
+      <p:nvGrpSpPr>
+        <p:cNvPr id="1" name=""/>
+        <p:cNvGrpSpPr/>
+        <p:nvPr/>
+      </p:nvGrpSpPr>
+      <p:grpSpPr>
+        <a:xfrm>
+          <a:off x="0" y="0"/>
+          <a:ext cx="0" cy="0"/>
+          <a:chOff x="0" y="0"/>
+          <a:chExt cx="0" cy="0"/>
+        </a:xfrm>
+      </p:grpSpPr>
+      <p:sp>
+        <p:nvSpPr>
+          <p:cNvPr id="2" name="Slide Image Placeholder 1"/>
+          <p:cNvSpPr>
+            <a:spLocks noGrp="1" noRot="1" noChangeAspect="1"/>
+          </p:cNvSpPr>
+          <p:nvPr>
+            <p:ph type="sldImg"/>
+          </p:nvPr>
+        </p:nvSpPr>
+        <p:spPr/>
+      </p:sp>
+      <p:sp>
+        <p:nvSpPr>
+          <p:cNvPr id="3" name="Notes Placeholder 2"/>
+          <p:cNvSpPr>
+            <a:spLocks noGrp="1"/>
+          </p:cNvSpPr>
+          <p:nvPr>
+            <p:ph type="body" idx="1"/>
+          </p:nvPr>
+        </p:nvSpPr>
+        <p:spPr/>
+        <p:txBody>
+          <a:bodyPr/>
+          <a:lstStyle/>
+          <a:p>
+            <a:endParaRPr lang="en-US" dirty="0"/>
+          </a:p>
+        </p:txBody>
+      </p:sp>
+      <p:sp>
+        <p:nvSpPr>
+          <p:cNvPr id="4" name="Slide Number Placeholder 3"/>
+          <p:cNvSpPr>
+            <a:spLocks noGrp="1"/>
+          </p:cNvSpPr>
+          <p:nvPr>
+            <p:ph type="sldNum" sz="quarter" idx="10"/>
+          </p:nvPr>
+        </p:nvSpPr>
+        <p:spPr/>
+        <p:txBody>
+          <a:bodyPr/>
+          <a:lstStyle/>
+          <a:p>
+            <a:fld id="{98849DEF-8BE0-8849-BA6F-4200DC94CA5B}" type="slidenum">
+              <a:rPr lang="en-US" smtClean="0"/>
+              <a:t>27</a:t>
+            </a:fld>
+            <a:endParaRPr lang="en-US"/>
+          </a:p>
+        </p:txBody>
+      </p:sp>
+    </p:spTree>
+    <p:extLst>
+      <p:ext uri="{BB962C8B-B14F-4D97-AF65-F5344CB8AC3E}">
+        <p14:creationId xmlns:p14="http://schemas.microsoft.com/office/powerpoint/2010/main" val="1560582666"/>
       </p:ext>
     </p:extLst>
   </p:cSld>
@@ -3637,15 +3809,7 @@
             </a:br>
             <a:r>
               <a:rPr lang="ar-IQ" dirty="0" smtClean="0"/>
-              <a:t>جلسه </a:t>
-            </a:r>
-            <a:r>
-              <a:rPr lang="ar-IQ" dirty="0" smtClean="0"/>
-              <a:t>هشتم: </a:t>
-            </a:r>
-            <a:r>
-              <a:rPr lang="ar-IQ" dirty="0" smtClean="0"/>
-              <a:t>مدل موجودیت-رابطه</a:t>
+              <a:t>جلسه هشتم: مدل موجودیت-رابطه</a:t>
             </a:r>
             <a:endParaRPr lang="en-US" dirty="0"/>
           </a:p>
@@ -17985,6 +18149,3447 @@
             </p:seq>
           </p:childTnLst>
         </p:cTn>
+      </p:par>
+    </p:tnLst>
+  </p:timing>
+</p:sld>
+</file>
+
+<file path=ppt/slides/slide24.xml><?xml version="1.0" encoding="utf-8"?>
+<p:sld xmlns:a="http://schemas.openxmlformats.org/drawingml/2006/main" xmlns:r="http://schemas.openxmlformats.org/officeDocument/2006/relationships" xmlns:p="http://schemas.openxmlformats.org/presentationml/2006/main">
+  <p:cSld>
+    <p:spTree>
+      <p:nvGrpSpPr>
+        <p:cNvPr id="1" name=""/>
+        <p:cNvGrpSpPr/>
+        <p:nvPr/>
+      </p:nvGrpSpPr>
+      <p:grpSpPr>
+        <a:xfrm>
+          <a:off x="0" y="0"/>
+          <a:ext cx="0" cy="0"/>
+          <a:chOff x="0" y="0"/>
+          <a:chExt cx="0" cy="0"/>
+        </a:xfrm>
+      </p:grpSpPr>
+      <p:sp>
+        <p:nvSpPr>
+          <p:cNvPr id="2" name="Title 1"/>
+          <p:cNvSpPr>
+            <a:spLocks noGrp="1"/>
+          </p:cNvSpPr>
+          <p:nvPr>
+            <p:ph type="title"/>
+          </p:nvPr>
+        </p:nvSpPr>
+        <p:spPr/>
+        <p:txBody>
+          <a:bodyPr/>
+          <a:lstStyle/>
+          <a:p>
+            <a:r>
+              <a:rPr lang="en-US" dirty="0" smtClean="0"/>
+              <a:t>Extra </a:t>
+            </a:r>
+            <a:r>
+              <a:rPr lang="en-US" dirty="0" smtClean="0"/>
+              <a:t>Activity</a:t>
+            </a:r>
+            <a:endParaRPr lang="en-US" dirty="0"/>
+          </a:p>
+        </p:txBody>
+      </p:sp>
+      <p:sp>
+        <p:nvSpPr>
+          <p:cNvPr id="3" name="Text Placeholder 2"/>
+          <p:cNvSpPr>
+            <a:spLocks noGrp="1"/>
+          </p:cNvSpPr>
+          <p:nvPr>
+            <p:ph type="body" idx="1"/>
+          </p:nvPr>
+        </p:nvSpPr>
+        <p:spPr/>
+        <p:txBody>
+          <a:bodyPr/>
+          <a:lstStyle/>
+          <a:p>
+            <a:endParaRPr lang="en-US" dirty="0"/>
+          </a:p>
+        </p:txBody>
+      </p:sp>
+      <p:grpSp>
+        <p:nvGrpSpPr>
+          <p:cNvPr id="4" name="Group 3"/>
+          <p:cNvGrpSpPr/>
+          <p:nvPr/>
+        </p:nvGrpSpPr>
+        <p:grpSpPr>
+          <a:xfrm>
+            <a:off x="0" y="-22510"/>
+            <a:ext cx="12192000" cy="307777"/>
+            <a:chOff x="0" y="-22510"/>
+            <a:chExt cx="12192000" cy="303520"/>
+          </a:xfrm>
+        </p:grpSpPr>
+        <p:sp>
+          <p:nvSpPr>
+            <p:cNvPr id="5" name="Rectangle 4"/>
+            <p:cNvSpPr/>
+            <p:nvPr/>
+          </p:nvSpPr>
+          <p:spPr>
+            <a:xfrm>
+              <a:off x="0" y="0"/>
+              <a:ext cx="12192000" cy="262759"/>
+            </a:xfrm>
+            <a:prstGeom prst="rect">
+              <a:avLst/>
+            </a:prstGeom>
+            <a:solidFill>
+              <a:schemeClr val="tx2">
+                <a:lumMod val="20000"/>
+                <a:lumOff val="80000"/>
+              </a:schemeClr>
+            </a:solidFill>
+            <a:ln>
+              <a:noFill/>
+            </a:ln>
+          </p:spPr>
+          <p:style>
+            <a:lnRef idx="2">
+              <a:schemeClr val="accent1">
+                <a:shade val="50000"/>
+              </a:schemeClr>
+            </a:lnRef>
+            <a:fillRef idx="1">
+              <a:schemeClr val="accent1"/>
+            </a:fillRef>
+            <a:effectRef idx="0">
+              <a:schemeClr val="accent1"/>
+            </a:effectRef>
+            <a:fontRef idx="minor">
+              <a:schemeClr val="lt1"/>
+            </a:fontRef>
+          </p:style>
+          <p:txBody>
+            <a:bodyPr rtlCol="0" anchor="ctr"/>
+            <a:lstStyle/>
+            <a:p>
+              <a:pPr algn="r"/>
+              <a:endParaRPr lang="en-US" sz="1400" b="1" i="1" dirty="0">
+                <a:solidFill>
+                  <a:schemeClr val="tx1">
+                    <a:lumMod val="65000"/>
+                    <a:lumOff val="35000"/>
+                  </a:schemeClr>
+                </a:solidFill>
+                <a:latin typeface="+mj-lt"/>
+              </a:endParaRPr>
+            </a:p>
+          </p:txBody>
+        </p:sp>
+        <p:sp>
+          <p:nvSpPr>
+            <p:cNvPr id="6" name="TextBox 5"/>
+            <p:cNvSpPr txBox="1"/>
+            <p:nvPr/>
+          </p:nvSpPr>
+          <p:spPr>
+            <a:xfrm>
+              <a:off x="188780" y="-22510"/>
+              <a:ext cx="2746265" cy="303520"/>
+            </a:xfrm>
+            <a:prstGeom prst="rect">
+              <a:avLst/>
+            </a:prstGeom>
+            <a:noFill/>
+          </p:spPr>
+          <p:txBody>
+            <a:bodyPr wrap="none" rtlCol="0">
+              <a:spAutoFit/>
+            </a:bodyPr>
+            <a:lstStyle/>
+            <a:p>
+              <a:r>
+                <a:rPr lang="en-US" sz="1400" b="1" i="1" dirty="0" smtClean="0">
+                  <a:solidFill>
+                    <a:schemeClr val="tx1">
+                      <a:lumMod val="65000"/>
+                      <a:lumOff val="35000"/>
+                    </a:schemeClr>
+                  </a:solidFill>
+                  <a:latin typeface="+mj-lt"/>
+                </a:rPr>
+                <a:t>Lecture </a:t>
+              </a:r>
+              <a:r>
+                <a:rPr lang="en-US" sz="1400" b="1" i="1" dirty="0" smtClean="0">
+                  <a:solidFill>
+                    <a:schemeClr val="tx1">
+                      <a:lumMod val="65000"/>
+                      <a:lumOff val="35000"/>
+                    </a:schemeClr>
+                  </a:solidFill>
+                  <a:latin typeface="+mj-lt"/>
+                </a:rPr>
+                <a:t>8  </a:t>
+              </a:r>
+              <a:r>
+                <a:rPr lang="en-US" sz="1400" b="1" i="1" dirty="0">
+                  <a:solidFill>
+                    <a:schemeClr val="tx1">
+                      <a:lumMod val="65000"/>
+                      <a:lumOff val="35000"/>
+                    </a:schemeClr>
+                  </a:solidFill>
+                  <a:latin typeface="+mj-lt"/>
+                </a:rPr>
+                <a:t>&gt;  </a:t>
+              </a:r>
+              <a:r>
+                <a:rPr lang="en-US" sz="1400" b="1" i="1" dirty="0" smtClean="0">
+                  <a:solidFill>
+                    <a:schemeClr val="tx1">
+                      <a:lumMod val="65000"/>
+                      <a:lumOff val="35000"/>
+                    </a:schemeClr>
+                  </a:solidFill>
+                  <a:latin typeface="+mj-lt"/>
+                </a:rPr>
+                <a:t>Section </a:t>
+              </a:r>
+              <a:r>
+                <a:rPr lang="en-US" sz="1400" b="1" i="1" dirty="0" smtClean="0">
+                  <a:solidFill>
+                    <a:schemeClr val="tx1">
+                      <a:lumMod val="65000"/>
+                      <a:lumOff val="35000"/>
+                    </a:schemeClr>
+                  </a:solidFill>
+                  <a:latin typeface="+mj-lt"/>
+                </a:rPr>
+                <a:t>1  </a:t>
+              </a:r>
+              <a:r>
+                <a:rPr lang="en-US" sz="1400" b="1" i="1" dirty="0">
+                  <a:solidFill>
+                    <a:schemeClr val="tx1">
+                      <a:lumMod val="65000"/>
+                      <a:lumOff val="35000"/>
+                    </a:schemeClr>
+                  </a:solidFill>
+                  <a:latin typeface="+mj-lt"/>
+                </a:rPr>
+                <a:t>&gt;  </a:t>
+              </a:r>
+              <a:r>
+                <a:rPr lang="en-US" sz="1400" b="1" i="1" dirty="0" smtClean="0">
+                  <a:solidFill>
+                    <a:schemeClr val="tx1">
+                      <a:lumMod val="65000"/>
+                      <a:lumOff val="35000"/>
+                    </a:schemeClr>
+                  </a:solidFill>
+                  <a:latin typeface="+mj-lt"/>
+                </a:rPr>
+                <a:t>ACTIVITY</a:t>
+              </a:r>
+              <a:endParaRPr lang="en-US" sz="1400" b="1" i="1" dirty="0">
+                <a:solidFill>
+                  <a:schemeClr val="tx1">
+                    <a:lumMod val="65000"/>
+                    <a:lumOff val="35000"/>
+                  </a:schemeClr>
+                </a:solidFill>
+                <a:latin typeface="+mj-lt"/>
+              </a:endParaRPr>
+            </a:p>
+          </p:txBody>
+        </p:sp>
+      </p:grpSp>
+    </p:spTree>
+    <p:extLst>
+      <p:ext uri="{BB962C8B-B14F-4D97-AF65-F5344CB8AC3E}">
+        <p14:creationId xmlns:p14="http://schemas.microsoft.com/office/powerpoint/2010/main" val="272852295"/>
+      </p:ext>
+    </p:extLst>
+  </p:cSld>
+  <p:clrMapOvr>
+    <a:masterClrMapping/>
+  </p:clrMapOvr>
+  <p:timing>
+    <p:tnLst>
+      <p:par>
+        <p:cTn xmlns:p14="http://schemas.microsoft.com/office/powerpoint/2010/main" id="1" dur="indefinite" restart="never" nodeType="tmRoot"/>
+      </p:par>
+    </p:tnLst>
+  </p:timing>
+</p:sld>
+</file>
+
+<file path=ppt/slides/slide25.xml><?xml version="1.0" encoding="utf-8"?>
+<p:sld xmlns:a="http://schemas.openxmlformats.org/drawingml/2006/main" xmlns:r="http://schemas.openxmlformats.org/officeDocument/2006/relationships" xmlns:p="http://schemas.openxmlformats.org/presentationml/2006/main">
+  <p:cSld>
+    <p:spTree>
+      <p:nvGrpSpPr>
+        <p:cNvPr id="1" name=""/>
+        <p:cNvGrpSpPr/>
+        <p:nvPr/>
+      </p:nvGrpSpPr>
+      <p:grpSpPr>
+        <a:xfrm>
+          <a:off x="0" y="0"/>
+          <a:ext cx="0" cy="0"/>
+          <a:chOff x="0" y="0"/>
+          <a:chExt cx="0" cy="0"/>
+        </a:xfrm>
+      </p:grpSpPr>
+      <p:sp>
+        <p:nvSpPr>
+          <p:cNvPr id="2" name="Title 1"/>
+          <p:cNvSpPr>
+            <a:spLocks noGrp="1"/>
+          </p:cNvSpPr>
+          <p:nvPr>
+            <p:ph type="title"/>
+          </p:nvPr>
+        </p:nvSpPr>
+        <p:spPr>
+          <a:xfrm>
+            <a:off x="838200" y="484093"/>
+            <a:ext cx="10515600" cy="1886511"/>
+          </a:xfrm>
+        </p:spPr>
+        <p:txBody>
+          <a:bodyPr/>
+          <a:lstStyle/>
+          <a:p>
+            <a:r>
+              <a:rPr lang="en-US" dirty="0" smtClean="0"/>
+              <a:t>Add in: Subclasses, constraints, and weak entity sets</a:t>
+            </a:r>
+            <a:endParaRPr lang="en-US" dirty="0"/>
+          </a:p>
+        </p:txBody>
+      </p:sp>
+      <p:sp>
+        <p:nvSpPr>
+          <p:cNvPr id="4" name="Slide Number Placeholder 3"/>
+          <p:cNvSpPr>
+            <a:spLocks noGrp="1"/>
+          </p:cNvSpPr>
+          <p:nvPr>
+            <p:ph type="sldNum" sz="quarter" idx="12"/>
+          </p:nvPr>
+        </p:nvSpPr>
+        <p:spPr/>
+        <p:txBody>
+          <a:bodyPr/>
+          <a:lstStyle/>
+          <a:p>
+            <a:fld id="{40A01959-B587-3B45-A9B3-C17F42F09305}" type="slidenum">
+              <a:rPr lang="en-US" smtClean="0"/>
+              <a:t>25</a:t>
+            </a:fld>
+            <a:endParaRPr lang="en-US" dirty="0"/>
+          </a:p>
+        </p:txBody>
+      </p:sp>
+      <p:grpSp>
+        <p:nvGrpSpPr>
+          <p:cNvPr id="5" name="Group 4"/>
+          <p:cNvGrpSpPr/>
+          <p:nvPr/>
+        </p:nvGrpSpPr>
+        <p:grpSpPr>
+          <a:xfrm>
+            <a:off x="0" y="-22510"/>
+            <a:ext cx="12192000" cy="307777"/>
+            <a:chOff x="0" y="-22510"/>
+            <a:chExt cx="12192000" cy="307777"/>
+          </a:xfrm>
+        </p:grpSpPr>
+        <p:sp>
+          <p:nvSpPr>
+            <p:cNvPr id="6" name="Rectangle 5"/>
+            <p:cNvSpPr/>
+            <p:nvPr/>
+          </p:nvSpPr>
+          <p:spPr>
+            <a:xfrm>
+              <a:off x="0" y="0"/>
+              <a:ext cx="12192000" cy="262759"/>
+            </a:xfrm>
+            <a:prstGeom prst="rect">
+              <a:avLst/>
+            </a:prstGeom>
+            <a:solidFill>
+              <a:schemeClr val="tx2">
+                <a:lumMod val="20000"/>
+                <a:lumOff val="80000"/>
+              </a:schemeClr>
+            </a:solidFill>
+            <a:ln>
+              <a:noFill/>
+            </a:ln>
+          </p:spPr>
+          <p:style>
+            <a:lnRef idx="2">
+              <a:schemeClr val="accent1">
+                <a:shade val="50000"/>
+              </a:schemeClr>
+            </a:lnRef>
+            <a:fillRef idx="1">
+              <a:schemeClr val="accent1"/>
+            </a:fillRef>
+            <a:effectRef idx="0">
+              <a:schemeClr val="accent1"/>
+            </a:effectRef>
+            <a:fontRef idx="minor">
+              <a:schemeClr val="lt1"/>
+            </a:fontRef>
+          </p:style>
+          <p:txBody>
+            <a:bodyPr rtlCol="0" anchor="ctr"/>
+            <a:lstStyle/>
+            <a:p>
+              <a:pPr algn="r"/>
+              <a:endParaRPr lang="en-US" sz="1400" b="1" i="1" dirty="0">
+                <a:solidFill>
+                  <a:schemeClr val="tx1">
+                    <a:lumMod val="65000"/>
+                    <a:lumOff val="35000"/>
+                  </a:schemeClr>
+                </a:solidFill>
+                <a:latin typeface="+mj-lt"/>
+              </a:endParaRPr>
+            </a:p>
+          </p:txBody>
+        </p:sp>
+        <p:sp>
+          <p:nvSpPr>
+            <p:cNvPr id="7" name="TextBox 6"/>
+            <p:cNvSpPr txBox="1"/>
+            <p:nvPr/>
+          </p:nvSpPr>
+          <p:spPr>
+            <a:xfrm>
+              <a:off x="188780" y="-22510"/>
+              <a:ext cx="2784737" cy="307777"/>
+            </a:xfrm>
+            <a:prstGeom prst="rect">
+              <a:avLst/>
+            </a:prstGeom>
+            <a:noFill/>
+          </p:spPr>
+          <p:txBody>
+            <a:bodyPr wrap="none" rtlCol="0">
+              <a:spAutoFit/>
+            </a:bodyPr>
+            <a:lstStyle/>
+            <a:p>
+              <a:r>
+                <a:rPr lang="en-US" sz="1400" b="1" i="1" dirty="0" smtClean="0">
+                  <a:solidFill>
+                    <a:schemeClr val="tx1">
+                      <a:lumMod val="65000"/>
+                      <a:lumOff val="35000"/>
+                    </a:schemeClr>
+                  </a:solidFill>
+                  <a:latin typeface="+mj-lt"/>
+                </a:rPr>
+                <a:t>Lecture </a:t>
+              </a:r>
+              <a:r>
+                <a:rPr lang="en-US" sz="1400" b="1" i="1" dirty="0" smtClean="0">
+                  <a:solidFill>
+                    <a:schemeClr val="tx1">
+                      <a:lumMod val="65000"/>
+                      <a:lumOff val="35000"/>
+                    </a:schemeClr>
+                  </a:solidFill>
+                  <a:latin typeface="+mj-lt"/>
+                </a:rPr>
+                <a:t>8  </a:t>
+              </a:r>
+              <a:r>
+                <a:rPr lang="en-US" sz="1400" b="1" i="1" dirty="0" smtClean="0">
+                  <a:solidFill>
+                    <a:schemeClr val="tx1">
+                      <a:lumMod val="65000"/>
+                      <a:lumOff val="35000"/>
+                    </a:schemeClr>
+                  </a:solidFill>
+                  <a:latin typeface="+mj-lt"/>
+                </a:rPr>
+                <a:t>&gt;  Section  </a:t>
+              </a:r>
+              <a:r>
+                <a:rPr lang="en-US" sz="1400" b="1" i="1" dirty="0" smtClean="0">
+                  <a:solidFill>
+                    <a:schemeClr val="tx1">
+                      <a:lumMod val="65000"/>
+                      <a:lumOff val="35000"/>
+                    </a:schemeClr>
+                  </a:solidFill>
+                  <a:latin typeface="+mj-lt"/>
+                </a:rPr>
+                <a:t>1  </a:t>
+              </a:r>
+              <a:r>
+                <a:rPr lang="en-US" sz="1400" b="1" i="1" dirty="0" smtClean="0">
+                  <a:solidFill>
+                    <a:schemeClr val="tx1">
+                      <a:lumMod val="65000"/>
+                      <a:lumOff val="35000"/>
+                    </a:schemeClr>
+                  </a:solidFill>
+                  <a:latin typeface="+mj-lt"/>
+                </a:rPr>
+                <a:t>&gt;  ACTIVITY</a:t>
+              </a:r>
+              <a:endParaRPr lang="en-US" sz="1400" b="1" i="1" dirty="0">
+                <a:solidFill>
+                  <a:schemeClr val="tx1">
+                    <a:lumMod val="65000"/>
+                    <a:lumOff val="35000"/>
+                  </a:schemeClr>
+                </a:solidFill>
+                <a:latin typeface="+mj-lt"/>
+              </a:endParaRPr>
+            </a:p>
+          </p:txBody>
+        </p:sp>
+      </p:grpSp>
+      <p:sp>
+        <p:nvSpPr>
+          <p:cNvPr id="9" name="TextBox 8"/>
+          <p:cNvSpPr txBox="1"/>
+          <p:nvPr/>
+        </p:nvSpPr>
+        <p:spPr>
+          <a:xfrm>
+            <a:off x="683317" y="5131359"/>
+            <a:ext cx="1978658" cy="1015663"/>
+          </a:xfrm>
+          <a:prstGeom prst="rect">
+            <a:avLst/>
+          </a:prstGeom>
+          <a:noFill/>
+        </p:spPr>
+        <p:txBody>
+          <a:bodyPr wrap="square" rtlCol="0">
+            <a:spAutoFit/>
+          </a:bodyPr>
+          <a:lstStyle/>
+          <a:p>
+            <a:r>
+              <a:rPr lang="en-US" sz="2000" dirty="0" smtClean="0">
+                <a:latin typeface="+mj-lt"/>
+              </a:rPr>
+              <a:t>Teams belong </a:t>
+            </a:r>
+            <a:r>
+              <a:rPr lang="en-US" sz="2000" smtClean="0">
+                <a:latin typeface="+mj-lt"/>
+              </a:rPr>
+              <a:t>to cities- model as </a:t>
+            </a:r>
+            <a:r>
+              <a:rPr lang="en-US" sz="2000" b="1" i="1" smtClean="0">
+                <a:latin typeface="+mj-lt"/>
+              </a:rPr>
+              <a:t>weak entity sets</a:t>
+            </a:r>
+            <a:endParaRPr lang="en-US" sz="2000" dirty="0" smtClean="0">
+              <a:latin typeface="+mj-lt"/>
+            </a:endParaRPr>
+          </a:p>
+        </p:txBody>
+      </p:sp>
+      <p:sp>
+        <p:nvSpPr>
+          <p:cNvPr id="10" name="TextBox 9"/>
+          <p:cNvSpPr txBox="1"/>
+          <p:nvPr/>
+        </p:nvSpPr>
+        <p:spPr>
+          <a:xfrm>
+            <a:off x="3129526" y="5163671"/>
+            <a:ext cx="2217173" cy="1631216"/>
+          </a:xfrm>
+          <a:prstGeom prst="rect">
+            <a:avLst/>
+          </a:prstGeom>
+          <a:noFill/>
+        </p:spPr>
+        <p:txBody>
+          <a:bodyPr wrap="square" rtlCol="0">
+            <a:spAutoFit/>
+          </a:bodyPr>
+          <a:lstStyle/>
+          <a:p>
+            <a:r>
+              <a:rPr lang="en-US" sz="2000" dirty="0" smtClean="0">
+                <a:latin typeface="+mj-lt"/>
+              </a:rPr>
+              <a:t>Players are either on Offense or Defense, and are of types (QB, RB, WR, </a:t>
+            </a:r>
+            <a:r>
+              <a:rPr lang="en-US" sz="2000" dirty="0" smtClean="0">
+                <a:latin typeface="+mj-lt"/>
+              </a:rPr>
+              <a:t>TE)</a:t>
+            </a:r>
+            <a:endParaRPr lang="en-US" sz="2000" dirty="0">
+              <a:latin typeface="+mj-lt"/>
+            </a:endParaRPr>
+          </a:p>
+        </p:txBody>
+      </p:sp>
+      <p:sp>
+        <p:nvSpPr>
+          <p:cNvPr id="14" name="TextBox 13"/>
+          <p:cNvSpPr txBox="1"/>
+          <p:nvPr/>
+        </p:nvSpPr>
+        <p:spPr>
+          <a:xfrm>
+            <a:off x="838200" y="2568388"/>
+            <a:ext cx="3781035" cy="461665"/>
+          </a:xfrm>
+          <a:prstGeom prst="rect">
+            <a:avLst/>
+          </a:prstGeom>
+          <a:noFill/>
+        </p:spPr>
+        <p:txBody>
+          <a:bodyPr wrap="none" rtlCol="0">
+            <a:spAutoFit/>
+          </a:bodyPr>
+          <a:lstStyle/>
+          <a:p>
+            <a:r>
+              <a:rPr lang="en-US" sz="2400" smtClean="0">
+                <a:latin typeface="+mj-lt"/>
+              </a:rPr>
+              <a:t>Concepts to include / model:</a:t>
+            </a:r>
+            <a:endParaRPr lang="en-US" sz="2400">
+              <a:latin typeface="+mj-lt"/>
+            </a:endParaRPr>
+          </a:p>
+        </p:txBody>
+      </p:sp>
+      <p:sp>
+        <p:nvSpPr>
+          <p:cNvPr id="16" name="TextBox 15"/>
+          <p:cNvSpPr txBox="1"/>
+          <p:nvPr/>
+        </p:nvSpPr>
+        <p:spPr>
+          <a:xfrm>
+            <a:off x="8396254" y="5131358"/>
+            <a:ext cx="2282810" cy="1569660"/>
+          </a:xfrm>
+          <a:prstGeom prst="rect">
+            <a:avLst/>
+          </a:prstGeom>
+          <a:noFill/>
+        </p:spPr>
+        <p:txBody>
+          <a:bodyPr wrap="square" rtlCol="0">
+            <a:spAutoFit/>
+          </a:bodyPr>
+          <a:lstStyle/>
+          <a:p>
+            <a:pPr algn="ctr"/>
+            <a:r>
+              <a:rPr lang="en-US" sz="2400" dirty="0" smtClean="0">
+                <a:latin typeface="+mj-lt"/>
+              </a:rPr>
+              <a:t>Make sure you have designated keys for all our concepts!</a:t>
+            </a:r>
+          </a:p>
+        </p:txBody>
+      </p:sp>
+    </p:spTree>
+    <p:extLst>
+      <p:ext uri="{BB962C8B-B14F-4D97-AF65-F5344CB8AC3E}">
+        <p14:creationId xmlns:p14="http://schemas.microsoft.com/office/powerpoint/2010/main" val="263586137"/>
+      </p:ext>
+    </p:extLst>
+  </p:cSld>
+  <p:clrMapOvr>
+    <a:masterClrMapping/>
+  </p:clrMapOvr>
+  <p:timing>
+    <p:tnLst>
+      <p:par>
+        <p:cTn xmlns:p14="http://schemas.microsoft.com/office/powerpoint/2010/main" id="1" dur="indefinite" restart="never" nodeType="tmRoot"/>
+      </p:par>
+    </p:tnLst>
+  </p:timing>
+</p:sld>
+</file>
+
+<file path=ppt/slides/slide26.xml><?xml version="1.0" encoding="utf-8"?>
+<p:sld xmlns:a="http://schemas.openxmlformats.org/drawingml/2006/main" xmlns:r="http://schemas.openxmlformats.org/officeDocument/2006/relationships" xmlns:p="http://schemas.openxmlformats.org/presentationml/2006/main">
+  <p:cSld>
+    <p:spTree>
+      <p:nvGrpSpPr>
+        <p:cNvPr id="1" name=""/>
+        <p:cNvGrpSpPr/>
+        <p:nvPr/>
+      </p:nvGrpSpPr>
+      <p:grpSpPr>
+        <a:xfrm>
+          <a:off x="0" y="0"/>
+          <a:ext cx="0" cy="0"/>
+          <a:chOff x="0" y="0"/>
+          <a:chExt cx="0" cy="0"/>
+        </a:xfrm>
+      </p:grpSpPr>
+      <p:sp>
+        <p:nvSpPr>
+          <p:cNvPr id="16" name="Rectangle 15"/>
+          <p:cNvSpPr>
+            <a:spLocks noChangeArrowheads="1"/>
+          </p:cNvSpPr>
+          <p:nvPr/>
+        </p:nvSpPr>
+        <p:spPr bwMode="auto">
+          <a:xfrm>
+            <a:off x="5456918" y="1757358"/>
+            <a:ext cx="968076" cy="413004"/>
+          </a:xfrm>
+          <a:prstGeom prst="rect">
+            <a:avLst/>
+          </a:prstGeom>
+          <a:solidFill>
+            <a:schemeClr val="accent2">
+              <a:lumMod val="20000"/>
+              <a:lumOff val="80000"/>
+            </a:schemeClr>
+          </a:solidFill>
+          <a:ln w="9525">
+            <a:solidFill>
+              <a:schemeClr val="tx1"/>
+            </a:solidFill>
+            <a:miter lim="800000"/>
+            <a:headEnd/>
+            <a:tailEnd/>
+          </a:ln>
+        </p:spPr>
+        <p:txBody>
+          <a:bodyPr wrap="none" anchor="ctr">
+            <a:prstTxWarp prst="textNoShape">
+              <a:avLst/>
+            </a:prstTxWarp>
+          </a:bodyPr>
+          <a:lstStyle/>
+          <a:p>
+            <a:pPr algn="ctr" eaLnBrk="0" fontAlgn="base" hangingPunct="0">
+              <a:spcBef>
+                <a:spcPct val="0"/>
+              </a:spcBef>
+              <a:spcAft>
+                <a:spcPct val="0"/>
+              </a:spcAft>
+            </a:pPr>
+            <a:r>
+              <a:rPr lang="en-US" sz="1200" dirty="0">
+                <a:solidFill>
+                  <a:srgbClr val="000000"/>
+                </a:solidFill>
+              </a:rPr>
+              <a:t>Teams</a:t>
+            </a:r>
+          </a:p>
+        </p:txBody>
+      </p:sp>
+      <p:cxnSp>
+        <p:nvCxnSpPr>
+          <p:cNvPr id="20" name="Straight Connector 19"/>
+          <p:cNvCxnSpPr>
+            <a:stCxn id="19" idx="4"/>
+            <a:endCxn id="16" idx="0"/>
+          </p:cNvCxnSpPr>
+          <p:nvPr/>
+        </p:nvCxnSpPr>
+        <p:spPr bwMode="auto">
+          <a:xfrm>
+            <a:off x="5940956" y="1423473"/>
+            <a:ext cx="0" cy="333885"/>
+          </a:xfrm>
+          <a:prstGeom prst="line">
+            <a:avLst/>
+          </a:prstGeom>
+          <a:solidFill>
+            <a:srgbClr val="C0C0C0">
+              <a:alpha val="50000"/>
+            </a:srgbClr>
+          </a:solidFill>
+          <a:ln w="9525" cap="flat" cmpd="sng" algn="ctr">
+            <a:solidFill>
+              <a:schemeClr val="tx1"/>
+            </a:solidFill>
+            <a:prstDash val="solid"/>
+            <a:round/>
+            <a:headEnd type="none" w="med" len="med"/>
+            <a:tailEnd type="none" w="med" len="med"/>
+          </a:ln>
+          <a:effectLst/>
+        </p:spPr>
+      </p:cxnSp>
+      <p:sp>
+        <p:nvSpPr>
+          <p:cNvPr id="90" name="AutoShape 8"/>
+          <p:cNvSpPr>
+            <a:spLocks noChangeArrowheads="1"/>
+          </p:cNvSpPr>
+          <p:nvPr/>
+        </p:nvSpPr>
+        <p:spPr bwMode="auto">
+          <a:xfrm>
+            <a:off x="5309929" y="2618756"/>
+            <a:ext cx="1262054" cy="531005"/>
+          </a:xfrm>
+          <a:prstGeom prst="diamond">
+            <a:avLst/>
+          </a:prstGeom>
+          <a:solidFill>
+            <a:schemeClr val="accent1"/>
+          </a:solidFill>
+          <a:ln w="25400">
+            <a:solidFill>
+              <a:schemeClr val="tx1"/>
+            </a:solidFill>
+            <a:miter lim="800000"/>
+            <a:headEnd/>
+            <a:tailEnd/>
+          </a:ln>
+        </p:spPr>
+        <p:txBody>
+          <a:bodyPr wrap="none" anchor="ctr">
+            <a:prstTxWarp prst="textNoShape">
+              <a:avLst/>
+            </a:prstTxWarp>
+          </a:bodyPr>
+          <a:lstStyle/>
+          <a:p>
+            <a:pPr algn="ctr" eaLnBrk="0" fontAlgn="base" hangingPunct="0">
+              <a:spcBef>
+                <a:spcPct val="0"/>
+              </a:spcBef>
+              <a:spcAft>
+                <a:spcPct val="0"/>
+              </a:spcAft>
+            </a:pPr>
+            <a:r>
+              <a:rPr lang="en-US" sz="1200" dirty="0" err="1" smtClean="0">
+                <a:solidFill>
+                  <a:srgbClr val="000000"/>
+                </a:solidFill>
+              </a:rPr>
+              <a:t>LocatedIn</a:t>
+            </a:r>
+            <a:endParaRPr lang="en-US" sz="1200" dirty="0">
+              <a:solidFill>
+                <a:srgbClr val="000000"/>
+              </a:solidFill>
+            </a:endParaRPr>
+          </a:p>
+        </p:txBody>
+      </p:sp>
+      <p:cxnSp>
+        <p:nvCxnSpPr>
+          <p:cNvPr id="91" name="Straight Connector 90"/>
+          <p:cNvCxnSpPr>
+            <a:stCxn id="90" idx="0"/>
+            <a:endCxn id="16" idx="2"/>
+          </p:cNvCxnSpPr>
+          <p:nvPr/>
+        </p:nvCxnSpPr>
+        <p:spPr bwMode="auto">
+          <a:xfrm flipV="1">
+            <a:off x="5940956" y="2170363"/>
+            <a:ext cx="0" cy="448393"/>
+          </a:xfrm>
+          <a:prstGeom prst="line">
+            <a:avLst/>
+          </a:prstGeom>
+          <a:solidFill>
+            <a:srgbClr val="C0C0C0">
+              <a:alpha val="50000"/>
+            </a:srgbClr>
+          </a:solidFill>
+          <a:ln w="9525" cap="flat" cmpd="sng" algn="ctr">
+            <a:solidFill>
+              <a:schemeClr val="tx1"/>
+            </a:solidFill>
+            <a:prstDash val="solid"/>
+            <a:round/>
+            <a:headEnd type="none" w="med" len="med"/>
+            <a:tailEnd type="none" w="med" len="med"/>
+          </a:ln>
+          <a:effectLst/>
+        </p:spPr>
+      </p:cxnSp>
+      <p:cxnSp>
+        <p:nvCxnSpPr>
+          <p:cNvPr id="96" name="Straight Connector 95"/>
+          <p:cNvCxnSpPr>
+            <a:stCxn id="111" idx="0"/>
+            <a:endCxn id="90" idx="2"/>
+          </p:cNvCxnSpPr>
+          <p:nvPr/>
+        </p:nvCxnSpPr>
+        <p:spPr bwMode="auto">
+          <a:xfrm flipV="1">
+            <a:off x="5940956" y="3149760"/>
+            <a:ext cx="0" cy="333886"/>
+          </a:xfrm>
+          <a:prstGeom prst="line">
+            <a:avLst/>
+          </a:prstGeom>
+          <a:solidFill>
+            <a:srgbClr val="C0C0C0">
+              <a:alpha val="50000"/>
+            </a:srgbClr>
+          </a:solidFill>
+          <a:ln w="9525" cap="flat" cmpd="sng" algn="ctr">
+            <a:solidFill>
+              <a:schemeClr val="tx1"/>
+            </a:solidFill>
+            <a:prstDash val="solid"/>
+            <a:round/>
+            <a:headEnd type="none" w="med" len="med"/>
+            <a:tailEnd type="none" w="med" len="med"/>
+          </a:ln>
+          <a:effectLst/>
+        </p:spPr>
+      </p:cxnSp>
+      <p:cxnSp>
+        <p:nvCxnSpPr>
+          <p:cNvPr id="99" name="Straight Arrow Connector 98"/>
+          <p:cNvCxnSpPr>
+            <a:stCxn id="16" idx="2"/>
+            <a:endCxn id="90" idx="0"/>
+          </p:cNvCxnSpPr>
+          <p:nvPr/>
+        </p:nvCxnSpPr>
+        <p:spPr>
+          <a:xfrm>
+            <a:off x="5940956" y="2170363"/>
+            <a:ext cx="0" cy="448393"/>
+          </a:xfrm>
+          <a:prstGeom prst="straightConnector1">
+            <a:avLst/>
+          </a:prstGeom>
+          <a:ln w="28575" cmpd="sng">
+            <a:solidFill>
+              <a:srgbClr val="000000"/>
+            </a:solidFill>
+            <a:headEnd type="none"/>
+            <a:tailEnd type="triangle"/>
+          </a:ln>
+        </p:spPr>
+        <p:style>
+          <a:lnRef idx="2">
+            <a:schemeClr val="accent1"/>
+          </a:lnRef>
+          <a:fillRef idx="0">
+            <a:schemeClr val="accent1"/>
+          </a:fillRef>
+          <a:effectRef idx="1">
+            <a:schemeClr val="accent1"/>
+          </a:effectRef>
+          <a:fontRef idx="minor">
+            <a:schemeClr val="tx1"/>
+          </a:fontRef>
+        </p:style>
+      </p:cxnSp>
+      <p:sp>
+        <p:nvSpPr>
+          <p:cNvPr id="111" name="Rectangle 110"/>
+          <p:cNvSpPr>
+            <a:spLocks noChangeArrowheads="1"/>
+          </p:cNvSpPr>
+          <p:nvPr/>
+        </p:nvSpPr>
+        <p:spPr bwMode="auto">
+          <a:xfrm>
+            <a:off x="5456918" y="3483646"/>
+            <a:ext cx="968076" cy="413004"/>
+          </a:xfrm>
+          <a:prstGeom prst="rect">
+            <a:avLst/>
+          </a:prstGeom>
+          <a:solidFill>
+            <a:schemeClr val="accent2">
+              <a:lumMod val="20000"/>
+              <a:lumOff val="80000"/>
+            </a:schemeClr>
+          </a:solidFill>
+          <a:ln w="9525">
+            <a:solidFill>
+              <a:schemeClr val="tx1"/>
+            </a:solidFill>
+            <a:miter lim="800000"/>
+            <a:headEnd/>
+            <a:tailEnd/>
+          </a:ln>
+        </p:spPr>
+        <p:txBody>
+          <a:bodyPr wrap="none" anchor="ctr">
+            <a:prstTxWarp prst="textNoShape">
+              <a:avLst/>
+            </a:prstTxWarp>
+          </a:bodyPr>
+          <a:lstStyle/>
+          <a:p>
+            <a:pPr algn="ctr" eaLnBrk="0" fontAlgn="base" hangingPunct="0">
+              <a:spcBef>
+                <a:spcPct val="0"/>
+              </a:spcBef>
+              <a:spcAft>
+                <a:spcPct val="0"/>
+              </a:spcAft>
+            </a:pPr>
+            <a:r>
+              <a:rPr lang="en-US" sz="1200" dirty="0">
+                <a:solidFill>
+                  <a:srgbClr val="000000"/>
+                </a:solidFill>
+              </a:rPr>
+              <a:t>Cities</a:t>
+            </a:r>
+          </a:p>
+        </p:txBody>
+      </p:sp>
+      <p:sp>
+        <p:nvSpPr>
+          <p:cNvPr id="72" name="TextBox 71"/>
+          <p:cNvSpPr txBox="1"/>
+          <p:nvPr/>
+        </p:nvSpPr>
+        <p:spPr>
+          <a:xfrm>
+            <a:off x="7887355" y="3459718"/>
+            <a:ext cx="1978658" cy="1015663"/>
+          </a:xfrm>
+          <a:prstGeom prst="rect">
+            <a:avLst/>
+          </a:prstGeom>
+          <a:noFill/>
+        </p:spPr>
+        <p:txBody>
+          <a:bodyPr wrap="square" rtlCol="0">
+            <a:spAutoFit/>
+          </a:bodyPr>
+          <a:lstStyle/>
+          <a:p>
+            <a:r>
+              <a:rPr lang="en-US" sz="2000" dirty="0">
+                <a:latin typeface="+mj-lt"/>
+              </a:rPr>
+              <a:t>Teams belong </a:t>
+            </a:r>
+            <a:r>
+              <a:rPr lang="en-US" sz="2000">
+                <a:latin typeface="+mj-lt"/>
+              </a:rPr>
+              <a:t>to cities- model as </a:t>
+            </a:r>
+            <a:r>
+              <a:rPr lang="en-US" sz="2000" b="1" i="1">
+                <a:latin typeface="+mj-lt"/>
+              </a:rPr>
+              <a:t>weak entity sets</a:t>
+            </a:r>
+            <a:endParaRPr lang="en-US" sz="2000" dirty="0">
+              <a:latin typeface="+mj-lt"/>
+            </a:endParaRPr>
+          </a:p>
+        </p:txBody>
+      </p:sp>
+      <p:grpSp>
+        <p:nvGrpSpPr>
+          <p:cNvPr id="15" name="Group 14"/>
+          <p:cNvGrpSpPr/>
+          <p:nvPr/>
+        </p:nvGrpSpPr>
+        <p:grpSpPr>
+          <a:xfrm>
+            <a:off x="0" y="-22510"/>
+            <a:ext cx="12192000" cy="307777"/>
+            <a:chOff x="0" y="-22510"/>
+            <a:chExt cx="12192000" cy="303520"/>
+          </a:xfrm>
+        </p:grpSpPr>
+        <p:sp>
+          <p:nvSpPr>
+            <p:cNvPr id="17" name="Rectangle 16"/>
+            <p:cNvSpPr/>
+            <p:nvPr/>
+          </p:nvSpPr>
+          <p:spPr>
+            <a:xfrm>
+              <a:off x="0" y="0"/>
+              <a:ext cx="12192000" cy="262759"/>
+            </a:xfrm>
+            <a:prstGeom prst="rect">
+              <a:avLst/>
+            </a:prstGeom>
+            <a:solidFill>
+              <a:schemeClr val="tx2">
+                <a:lumMod val="20000"/>
+                <a:lumOff val="80000"/>
+              </a:schemeClr>
+            </a:solidFill>
+            <a:ln>
+              <a:noFill/>
+            </a:ln>
+          </p:spPr>
+          <p:style>
+            <a:lnRef idx="2">
+              <a:schemeClr val="accent1">
+                <a:shade val="50000"/>
+              </a:schemeClr>
+            </a:lnRef>
+            <a:fillRef idx="1">
+              <a:schemeClr val="accent1"/>
+            </a:fillRef>
+            <a:effectRef idx="0">
+              <a:schemeClr val="accent1"/>
+            </a:effectRef>
+            <a:fontRef idx="minor">
+              <a:schemeClr val="lt1"/>
+            </a:fontRef>
+          </p:style>
+          <p:txBody>
+            <a:bodyPr rtlCol="0" anchor="ctr"/>
+            <a:lstStyle/>
+            <a:p>
+              <a:pPr algn="r"/>
+              <a:endParaRPr lang="en-US" sz="1400" b="1" i="1" dirty="0">
+                <a:solidFill>
+                  <a:schemeClr val="tx1">
+                    <a:lumMod val="65000"/>
+                    <a:lumOff val="35000"/>
+                  </a:schemeClr>
+                </a:solidFill>
+                <a:latin typeface="+mj-lt"/>
+              </a:endParaRPr>
+            </a:p>
+          </p:txBody>
+        </p:sp>
+        <p:sp>
+          <p:nvSpPr>
+            <p:cNvPr id="18" name="TextBox 17"/>
+            <p:cNvSpPr txBox="1"/>
+            <p:nvPr/>
+          </p:nvSpPr>
+          <p:spPr>
+            <a:xfrm>
+              <a:off x="188780" y="-22510"/>
+              <a:ext cx="3803996" cy="303520"/>
+            </a:xfrm>
+            <a:prstGeom prst="rect">
+              <a:avLst/>
+            </a:prstGeom>
+            <a:noFill/>
+          </p:spPr>
+          <p:txBody>
+            <a:bodyPr wrap="none" rtlCol="0">
+              <a:spAutoFit/>
+            </a:bodyPr>
+            <a:lstStyle/>
+            <a:p>
+              <a:r>
+                <a:rPr lang="en-US" sz="1400" b="1" i="1" dirty="0" smtClean="0">
+                  <a:solidFill>
+                    <a:schemeClr val="tx1">
+                      <a:lumMod val="65000"/>
+                      <a:lumOff val="35000"/>
+                    </a:schemeClr>
+                  </a:solidFill>
+                  <a:latin typeface="+mj-lt"/>
+                </a:rPr>
+                <a:t>Lecture 7  </a:t>
+              </a:r>
+              <a:r>
+                <a:rPr lang="en-US" sz="1400" b="1" i="1" dirty="0">
+                  <a:solidFill>
+                    <a:schemeClr val="tx1">
+                      <a:lumMod val="65000"/>
+                      <a:lumOff val="35000"/>
+                    </a:schemeClr>
+                  </a:solidFill>
+                  <a:latin typeface="+mj-lt"/>
+                </a:rPr>
+                <a:t>&gt;  </a:t>
+              </a:r>
+              <a:r>
+                <a:rPr lang="en-US" sz="1400" b="1" i="1" dirty="0" smtClean="0">
+                  <a:solidFill>
+                    <a:schemeClr val="tx1">
+                      <a:lumMod val="65000"/>
+                      <a:lumOff val="35000"/>
+                    </a:schemeClr>
+                  </a:solidFill>
+                  <a:latin typeface="+mj-lt"/>
+                </a:rPr>
+                <a:t>Section 2  </a:t>
+              </a:r>
+              <a:r>
+                <a:rPr lang="en-US" sz="1400" b="1" i="1" dirty="0">
+                  <a:solidFill>
+                    <a:schemeClr val="tx1">
+                      <a:lumMod val="65000"/>
+                      <a:lumOff val="35000"/>
+                    </a:schemeClr>
+                  </a:solidFill>
+                  <a:latin typeface="+mj-lt"/>
+                </a:rPr>
+                <a:t>&gt;  </a:t>
+              </a:r>
+              <a:r>
+                <a:rPr lang="en-US" sz="1400" b="1" i="1" dirty="0" smtClean="0">
+                  <a:solidFill>
+                    <a:schemeClr val="tx1">
+                      <a:lumMod val="65000"/>
+                      <a:lumOff val="35000"/>
+                    </a:schemeClr>
+                  </a:solidFill>
+                  <a:latin typeface="+mj-lt"/>
+                </a:rPr>
+                <a:t>ACTIVITY  &gt;  SOLUTIONS</a:t>
+              </a:r>
+              <a:endParaRPr lang="en-US" sz="1400" b="1" i="1" dirty="0">
+                <a:solidFill>
+                  <a:schemeClr val="tx1">
+                    <a:lumMod val="65000"/>
+                    <a:lumOff val="35000"/>
+                  </a:schemeClr>
+                </a:solidFill>
+                <a:latin typeface="+mj-lt"/>
+              </a:endParaRPr>
+            </a:p>
+          </p:txBody>
+        </p:sp>
+      </p:grpSp>
+      <p:grpSp>
+        <p:nvGrpSpPr>
+          <p:cNvPr id="6" name="Group 5"/>
+          <p:cNvGrpSpPr/>
+          <p:nvPr/>
+        </p:nvGrpSpPr>
+        <p:grpSpPr>
+          <a:xfrm>
+            <a:off x="5366161" y="892468"/>
+            <a:ext cx="1149590" cy="531005"/>
+            <a:chOff x="5366161" y="892468"/>
+            <a:chExt cx="1149590" cy="531005"/>
+          </a:xfrm>
+        </p:grpSpPr>
+        <p:sp>
+          <p:nvSpPr>
+            <p:cNvPr id="19" name="Oval 13"/>
+            <p:cNvSpPr>
+              <a:spLocks noChangeArrowheads="1"/>
+            </p:cNvSpPr>
+            <p:nvPr/>
+          </p:nvSpPr>
+          <p:spPr bwMode="auto">
+            <a:xfrm>
+              <a:off x="5366161" y="892468"/>
+              <a:ext cx="1149590" cy="531005"/>
+            </a:xfrm>
+            <a:prstGeom prst="ellipse">
+              <a:avLst/>
+            </a:prstGeom>
+            <a:solidFill>
+              <a:srgbClr val="00FF00"/>
+            </a:solidFill>
+            <a:ln w="9525">
+              <a:solidFill>
+                <a:schemeClr val="tx1"/>
+              </a:solidFill>
+              <a:round/>
+              <a:headEnd/>
+              <a:tailEnd/>
+            </a:ln>
+          </p:spPr>
+          <p:txBody>
+            <a:bodyPr wrap="none" anchor="ctr">
+              <a:prstTxWarp prst="textNoShape">
+                <a:avLst/>
+              </a:prstTxWarp>
+            </a:bodyPr>
+            <a:lstStyle/>
+            <a:p>
+              <a:pPr algn="ctr" eaLnBrk="0" fontAlgn="base" hangingPunct="0">
+                <a:spcBef>
+                  <a:spcPct val="0"/>
+                </a:spcBef>
+                <a:spcAft>
+                  <a:spcPct val="0"/>
+                </a:spcAft>
+              </a:pPr>
+              <a:r>
+                <a:rPr lang="en-US" sz="1200" dirty="0">
+                  <a:solidFill>
+                    <a:srgbClr val="000000"/>
+                  </a:solidFill>
+                </a:rPr>
+                <a:t>Team </a:t>
+              </a:r>
+              <a:r>
+                <a:rPr lang="en-US" sz="1200" dirty="0" smtClean="0">
+                  <a:solidFill>
+                    <a:srgbClr val="000000"/>
+                  </a:solidFill>
+                </a:rPr>
+                <a:t>Name</a:t>
+              </a:r>
+              <a:endParaRPr lang="en-US" sz="1200" dirty="0">
+                <a:solidFill>
+                  <a:srgbClr val="000000"/>
+                </a:solidFill>
+              </a:endParaRPr>
+            </a:p>
+          </p:txBody>
+        </p:sp>
+        <p:cxnSp>
+          <p:nvCxnSpPr>
+            <p:cNvPr id="4" name="Straight Connector 3"/>
+            <p:cNvCxnSpPr/>
+            <p:nvPr/>
+          </p:nvCxnSpPr>
+          <p:spPr>
+            <a:xfrm>
+              <a:off x="5534515" y="1263728"/>
+              <a:ext cx="812882" cy="0"/>
+            </a:xfrm>
+            <a:prstGeom prst="line">
+              <a:avLst/>
+            </a:prstGeom>
+            <a:ln>
+              <a:solidFill>
+                <a:schemeClr val="tx1"/>
+              </a:solidFill>
+              <a:prstDash val="dash"/>
+            </a:ln>
+          </p:spPr>
+          <p:style>
+            <a:lnRef idx="1">
+              <a:schemeClr val="accent1"/>
+            </a:lnRef>
+            <a:fillRef idx="0">
+              <a:schemeClr val="accent1"/>
+            </a:fillRef>
+            <a:effectRef idx="0">
+              <a:schemeClr val="accent1"/>
+            </a:effectRef>
+            <a:fontRef idx="minor">
+              <a:schemeClr val="tx1"/>
+            </a:fontRef>
+          </p:style>
+        </p:cxnSp>
+      </p:grpSp>
+      <p:sp>
+        <p:nvSpPr>
+          <p:cNvPr id="24" name="Oval 13"/>
+          <p:cNvSpPr>
+            <a:spLocks noChangeArrowheads="1"/>
+          </p:cNvSpPr>
+          <p:nvPr/>
+        </p:nvSpPr>
+        <p:spPr bwMode="auto">
+          <a:xfrm>
+            <a:off x="5366161" y="4229929"/>
+            <a:ext cx="1149590" cy="531005"/>
+          </a:xfrm>
+          <a:prstGeom prst="ellipse">
+            <a:avLst/>
+          </a:prstGeom>
+          <a:solidFill>
+            <a:srgbClr val="00FF00"/>
+          </a:solidFill>
+          <a:ln w="9525">
+            <a:solidFill>
+              <a:schemeClr val="tx1"/>
+            </a:solidFill>
+            <a:round/>
+            <a:headEnd/>
+            <a:tailEnd/>
+          </a:ln>
+        </p:spPr>
+        <p:txBody>
+          <a:bodyPr wrap="none" anchor="ctr">
+            <a:prstTxWarp prst="textNoShape">
+              <a:avLst/>
+            </a:prstTxWarp>
+          </a:bodyPr>
+          <a:lstStyle/>
+          <a:p>
+            <a:pPr algn="ctr" eaLnBrk="0" fontAlgn="base" hangingPunct="0">
+              <a:spcBef>
+                <a:spcPct val="0"/>
+              </a:spcBef>
+              <a:spcAft>
+                <a:spcPct val="0"/>
+              </a:spcAft>
+            </a:pPr>
+            <a:r>
+              <a:rPr lang="en-US" sz="1200" u="sng" dirty="0" smtClean="0">
+                <a:solidFill>
+                  <a:srgbClr val="000000"/>
+                </a:solidFill>
+              </a:rPr>
+              <a:t>Name</a:t>
+            </a:r>
+            <a:endParaRPr lang="en-US" sz="1200" u="sng" dirty="0">
+              <a:solidFill>
+                <a:srgbClr val="000000"/>
+              </a:solidFill>
+            </a:endParaRPr>
+          </a:p>
+        </p:txBody>
+      </p:sp>
+      <p:cxnSp>
+        <p:nvCxnSpPr>
+          <p:cNvPr id="26" name="Straight Connector 25"/>
+          <p:cNvCxnSpPr>
+            <a:stCxn id="24" idx="0"/>
+            <a:endCxn id="111" idx="2"/>
+          </p:cNvCxnSpPr>
+          <p:nvPr/>
+        </p:nvCxnSpPr>
+        <p:spPr bwMode="auto">
+          <a:xfrm flipV="1">
+            <a:off x="5940956" y="3896650"/>
+            <a:ext cx="0" cy="333279"/>
+          </a:xfrm>
+          <a:prstGeom prst="line">
+            <a:avLst/>
+          </a:prstGeom>
+          <a:solidFill>
+            <a:srgbClr val="C0C0C0">
+              <a:alpha val="50000"/>
+            </a:srgbClr>
+          </a:solidFill>
+          <a:ln w="9525" cap="flat" cmpd="sng" algn="ctr">
+            <a:solidFill>
+              <a:schemeClr val="tx1"/>
+            </a:solidFill>
+            <a:prstDash val="solid"/>
+            <a:round/>
+            <a:headEnd type="none" w="med" len="med"/>
+            <a:tailEnd type="none" w="med" len="med"/>
+          </a:ln>
+          <a:effectLst/>
+        </p:spPr>
+      </p:cxnSp>
+    </p:spTree>
+    <p:extLst>
+      <p:ext uri="{BB962C8B-B14F-4D97-AF65-F5344CB8AC3E}">
+        <p14:creationId xmlns:p14="http://schemas.microsoft.com/office/powerpoint/2010/main" val="360375626"/>
+      </p:ext>
+    </p:extLst>
+  </p:cSld>
+  <p:clrMapOvr>
+    <a:masterClrMapping/>
+  </p:clrMapOvr>
+  <p:timing>
+    <p:tnLst>
+      <p:par>
+        <p:cTn xmlns:p14="http://schemas.microsoft.com/office/powerpoint/2010/main" id="1" dur="indefinite" restart="never" nodeType="tmRoot"/>
+      </p:par>
+    </p:tnLst>
+  </p:timing>
+</p:sld>
+</file>
+
+<file path=ppt/slides/slide27.xml><?xml version="1.0" encoding="utf-8"?>
+<p:sld xmlns:a="http://schemas.openxmlformats.org/drawingml/2006/main" xmlns:r="http://schemas.openxmlformats.org/officeDocument/2006/relationships" xmlns:p="http://schemas.openxmlformats.org/presentationml/2006/main">
+  <p:cSld>
+    <p:spTree>
+      <p:nvGrpSpPr>
+        <p:cNvPr id="1" name=""/>
+        <p:cNvGrpSpPr/>
+        <p:nvPr/>
+      </p:nvGrpSpPr>
+      <p:grpSpPr>
+        <a:xfrm>
+          <a:off x="0" y="0"/>
+          <a:ext cx="0" cy="0"/>
+          <a:chOff x="0" y="0"/>
+          <a:chExt cx="0" cy="0"/>
+        </a:xfrm>
+      </p:grpSpPr>
+      <p:sp>
+        <p:nvSpPr>
+          <p:cNvPr id="16" name="Rectangle 15"/>
+          <p:cNvSpPr>
+            <a:spLocks noChangeArrowheads="1"/>
+          </p:cNvSpPr>
+          <p:nvPr/>
+        </p:nvSpPr>
+        <p:spPr bwMode="auto">
+          <a:xfrm>
+            <a:off x="5456918" y="1757358"/>
+            <a:ext cx="968076" cy="413004"/>
+          </a:xfrm>
+          <a:prstGeom prst="rect">
+            <a:avLst/>
+          </a:prstGeom>
+          <a:solidFill>
+            <a:schemeClr val="accent2">
+              <a:lumMod val="20000"/>
+              <a:lumOff val="80000"/>
+            </a:schemeClr>
+          </a:solidFill>
+          <a:ln w="9525">
+            <a:solidFill>
+              <a:schemeClr val="tx1"/>
+            </a:solidFill>
+            <a:miter lim="800000"/>
+            <a:headEnd/>
+            <a:tailEnd/>
+          </a:ln>
+        </p:spPr>
+        <p:txBody>
+          <a:bodyPr wrap="none" anchor="ctr">
+            <a:prstTxWarp prst="textNoShape">
+              <a:avLst/>
+            </a:prstTxWarp>
+          </a:bodyPr>
+          <a:lstStyle/>
+          <a:p>
+            <a:pPr algn="ctr" eaLnBrk="0" fontAlgn="base" hangingPunct="0">
+              <a:spcBef>
+                <a:spcPct val="0"/>
+              </a:spcBef>
+              <a:spcAft>
+                <a:spcPct val="0"/>
+              </a:spcAft>
+            </a:pPr>
+            <a:r>
+              <a:rPr lang="en-US" sz="1200" dirty="0">
+                <a:solidFill>
+                  <a:srgbClr val="000000"/>
+                </a:solidFill>
+              </a:rPr>
+              <a:t>Teams</a:t>
+            </a:r>
+          </a:p>
+        </p:txBody>
+      </p:sp>
+      <p:cxnSp>
+        <p:nvCxnSpPr>
+          <p:cNvPr id="20" name="Straight Connector 19"/>
+          <p:cNvCxnSpPr>
+            <a:stCxn id="19" idx="4"/>
+            <a:endCxn id="16" idx="0"/>
+          </p:cNvCxnSpPr>
+          <p:nvPr/>
+        </p:nvCxnSpPr>
+        <p:spPr bwMode="auto">
+          <a:xfrm>
+            <a:off x="5940956" y="1423473"/>
+            <a:ext cx="0" cy="333885"/>
+          </a:xfrm>
+          <a:prstGeom prst="line">
+            <a:avLst/>
+          </a:prstGeom>
+          <a:solidFill>
+            <a:srgbClr val="C0C0C0">
+              <a:alpha val="50000"/>
+            </a:srgbClr>
+          </a:solidFill>
+          <a:ln w="9525" cap="flat" cmpd="sng" algn="ctr">
+            <a:solidFill>
+              <a:schemeClr val="tx1"/>
+            </a:solidFill>
+            <a:prstDash val="solid"/>
+            <a:round/>
+            <a:headEnd type="none" w="med" len="med"/>
+            <a:tailEnd type="none" w="med" len="med"/>
+          </a:ln>
+          <a:effectLst/>
+        </p:spPr>
+      </p:cxnSp>
+      <p:sp>
+        <p:nvSpPr>
+          <p:cNvPr id="90" name="AutoShape 8"/>
+          <p:cNvSpPr>
+            <a:spLocks noChangeArrowheads="1"/>
+          </p:cNvSpPr>
+          <p:nvPr/>
+        </p:nvSpPr>
+        <p:spPr bwMode="auto">
+          <a:xfrm>
+            <a:off x="5309929" y="2618756"/>
+            <a:ext cx="1262054" cy="531005"/>
+          </a:xfrm>
+          <a:prstGeom prst="diamond">
+            <a:avLst/>
+          </a:prstGeom>
+          <a:solidFill>
+            <a:schemeClr val="accent1"/>
+          </a:solidFill>
+          <a:ln w="25400">
+            <a:solidFill>
+              <a:schemeClr val="tx1"/>
+            </a:solidFill>
+            <a:miter lim="800000"/>
+            <a:headEnd/>
+            <a:tailEnd/>
+          </a:ln>
+        </p:spPr>
+        <p:txBody>
+          <a:bodyPr wrap="none" anchor="ctr">
+            <a:prstTxWarp prst="textNoShape">
+              <a:avLst/>
+            </a:prstTxWarp>
+          </a:bodyPr>
+          <a:lstStyle/>
+          <a:p>
+            <a:pPr algn="ctr" eaLnBrk="0" fontAlgn="base" hangingPunct="0">
+              <a:spcBef>
+                <a:spcPct val="0"/>
+              </a:spcBef>
+              <a:spcAft>
+                <a:spcPct val="0"/>
+              </a:spcAft>
+            </a:pPr>
+            <a:r>
+              <a:rPr lang="en-US" sz="1200" dirty="0" err="1" smtClean="0">
+                <a:solidFill>
+                  <a:srgbClr val="000000"/>
+                </a:solidFill>
+              </a:rPr>
+              <a:t>LocatedIn</a:t>
+            </a:r>
+            <a:endParaRPr lang="en-US" sz="1200" dirty="0">
+              <a:solidFill>
+                <a:srgbClr val="000000"/>
+              </a:solidFill>
+            </a:endParaRPr>
+          </a:p>
+        </p:txBody>
+      </p:sp>
+      <p:cxnSp>
+        <p:nvCxnSpPr>
+          <p:cNvPr id="91" name="Straight Connector 90"/>
+          <p:cNvCxnSpPr>
+            <a:stCxn id="90" idx="0"/>
+            <a:endCxn id="16" idx="2"/>
+          </p:cNvCxnSpPr>
+          <p:nvPr/>
+        </p:nvCxnSpPr>
+        <p:spPr bwMode="auto">
+          <a:xfrm flipV="1">
+            <a:off x="5940956" y="2170363"/>
+            <a:ext cx="0" cy="448393"/>
+          </a:xfrm>
+          <a:prstGeom prst="line">
+            <a:avLst/>
+          </a:prstGeom>
+          <a:solidFill>
+            <a:srgbClr val="C0C0C0">
+              <a:alpha val="50000"/>
+            </a:srgbClr>
+          </a:solidFill>
+          <a:ln w="9525" cap="flat" cmpd="sng" algn="ctr">
+            <a:solidFill>
+              <a:schemeClr val="tx1"/>
+            </a:solidFill>
+            <a:prstDash val="solid"/>
+            <a:round/>
+            <a:headEnd type="none" w="med" len="med"/>
+            <a:tailEnd type="none" w="med" len="med"/>
+          </a:ln>
+          <a:effectLst/>
+        </p:spPr>
+      </p:cxnSp>
+      <p:cxnSp>
+        <p:nvCxnSpPr>
+          <p:cNvPr id="96" name="Straight Connector 95"/>
+          <p:cNvCxnSpPr>
+            <a:stCxn id="111" idx="0"/>
+            <a:endCxn id="90" idx="2"/>
+          </p:cNvCxnSpPr>
+          <p:nvPr/>
+        </p:nvCxnSpPr>
+        <p:spPr bwMode="auto">
+          <a:xfrm flipV="1">
+            <a:off x="5940956" y="3149760"/>
+            <a:ext cx="0" cy="333886"/>
+          </a:xfrm>
+          <a:prstGeom prst="line">
+            <a:avLst/>
+          </a:prstGeom>
+          <a:solidFill>
+            <a:srgbClr val="C0C0C0">
+              <a:alpha val="50000"/>
+            </a:srgbClr>
+          </a:solidFill>
+          <a:ln w="9525" cap="flat" cmpd="sng" algn="ctr">
+            <a:solidFill>
+              <a:schemeClr val="tx1"/>
+            </a:solidFill>
+            <a:prstDash val="solid"/>
+            <a:round/>
+            <a:headEnd type="none" w="med" len="med"/>
+            <a:tailEnd type="none" w="med" len="med"/>
+          </a:ln>
+          <a:effectLst/>
+        </p:spPr>
+      </p:cxnSp>
+      <p:cxnSp>
+        <p:nvCxnSpPr>
+          <p:cNvPr id="99" name="Straight Arrow Connector 98"/>
+          <p:cNvCxnSpPr>
+            <a:stCxn id="16" idx="2"/>
+            <a:endCxn id="90" idx="0"/>
+          </p:cNvCxnSpPr>
+          <p:nvPr/>
+        </p:nvCxnSpPr>
+        <p:spPr>
+          <a:xfrm>
+            <a:off x="5940956" y="2170363"/>
+            <a:ext cx="0" cy="448393"/>
+          </a:xfrm>
+          <a:prstGeom prst="straightConnector1">
+            <a:avLst/>
+          </a:prstGeom>
+          <a:ln w="28575" cmpd="sng">
+            <a:solidFill>
+              <a:srgbClr val="000000"/>
+            </a:solidFill>
+            <a:headEnd type="none"/>
+            <a:tailEnd type="triangle"/>
+          </a:ln>
+        </p:spPr>
+        <p:style>
+          <a:lnRef idx="2">
+            <a:schemeClr val="accent1"/>
+          </a:lnRef>
+          <a:fillRef idx="0">
+            <a:schemeClr val="accent1"/>
+          </a:fillRef>
+          <a:effectRef idx="1">
+            <a:schemeClr val="accent1"/>
+          </a:effectRef>
+          <a:fontRef idx="minor">
+            <a:schemeClr val="tx1"/>
+          </a:fontRef>
+        </p:style>
+      </p:cxnSp>
+      <p:sp>
+        <p:nvSpPr>
+          <p:cNvPr id="111" name="Rectangle 110"/>
+          <p:cNvSpPr>
+            <a:spLocks noChangeArrowheads="1"/>
+          </p:cNvSpPr>
+          <p:nvPr/>
+        </p:nvSpPr>
+        <p:spPr bwMode="auto">
+          <a:xfrm>
+            <a:off x="5456918" y="3483646"/>
+            <a:ext cx="968076" cy="413004"/>
+          </a:xfrm>
+          <a:prstGeom prst="rect">
+            <a:avLst/>
+          </a:prstGeom>
+          <a:solidFill>
+            <a:schemeClr val="accent2">
+              <a:lumMod val="20000"/>
+              <a:lumOff val="80000"/>
+            </a:schemeClr>
+          </a:solidFill>
+          <a:ln w="9525">
+            <a:solidFill>
+              <a:schemeClr val="tx1"/>
+            </a:solidFill>
+            <a:miter lim="800000"/>
+            <a:headEnd/>
+            <a:tailEnd/>
+          </a:ln>
+        </p:spPr>
+        <p:txBody>
+          <a:bodyPr wrap="none" anchor="ctr">
+            <a:prstTxWarp prst="textNoShape">
+              <a:avLst/>
+            </a:prstTxWarp>
+          </a:bodyPr>
+          <a:lstStyle/>
+          <a:p>
+            <a:pPr algn="ctr" eaLnBrk="0" fontAlgn="base" hangingPunct="0">
+              <a:spcBef>
+                <a:spcPct val="0"/>
+              </a:spcBef>
+              <a:spcAft>
+                <a:spcPct val="0"/>
+              </a:spcAft>
+            </a:pPr>
+            <a:r>
+              <a:rPr lang="en-US" sz="1200" dirty="0">
+                <a:solidFill>
+                  <a:srgbClr val="000000"/>
+                </a:solidFill>
+              </a:rPr>
+              <a:t>Cities</a:t>
+            </a:r>
+          </a:p>
+        </p:txBody>
+      </p:sp>
+      <p:grpSp>
+        <p:nvGrpSpPr>
+          <p:cNvPr id="15" name="Group 14"/>
+          <p:cNvGrpSpPr/>
+          <p:nvPr/>
+        </p:nvGrpSpPr>
+        <p:grpSpPr>
+          <a:xfrm>
+            <a:off x="0" y="-22510"/>
+            <a:ext cx="12192000" cy="307777"/>
+            <a:chOff x="0" y="-22510"/>
+            <a:chExt cx="12192000" cy="303520"/>
+          </a:xfrm>
+        </p:grpSpPr>
+        <p:sp>
+          <p:nvSpPr>
+            <p:cNvPr id="17" name="Rectangle 16"/>
+            <p:cNvSpPr/>
+            <p:nvPr/>
+          </p:nvSpPr>
+          <p:spPr>
+            <a:xfrm>
+              <a:off x="0" y="0"/>
+              <a:ext cx="12192000" cy="262759"/>
+            </a:xfrm>
+            <a:prstGeom prst="rect">
+              <a:avLst/>
+            </a:prstGeom>
+            <a:solidFill>
+              <a:schemeClr val="tx2">
+                <a:lumMod val="20000"/>
+                <a:lumOff val="80000"/>
+              </a:schemeClr>
+            </a:solidFill>
+            <a:ln>
+              <a:noFill/>
+            </a:ln>
+          </p:spPr>
+          <p:style>
+            <a:lnRef idx="2">
+              <a:schemeClr val="accent1">
+                <a:shade val="50000"/>
+              </a:schemeClr>
+            </a:lnRef>
+            <a:fillRef idx="1">
+              <a:schemeClr val="accent1"/>
+            </a:fillRef>
+            <a:effectRef idx="0">
+              <a:schemeClr val="accent1"/>
+            </a:effectRef>
+            <a:fontRef idx="minor">
+              <a:schemeClr val="lt1"/>
+            </a:fontRef>
+          </p:style>
+          <p:txBody>
+            <a:bodyPr rtlCol="0" anchor="ctr"/>
+            <a:lstStyle/>
+            <a:p>
+              <a:pPr algn="r"/>
+              <a:endParaRPr lang="en-US" sz="1400" b="1" i="1" dirty="0">
+                <a:solidFill>
+                  <a:schemeClr val="tx1">
+                    <a:lumMod val="65000"/>
+                    <a:lumOff val="35000"/>
+                  </a:schemeClr>
+                </a:solidFill>
+                <a:latin typeface="+mj-lt"/>
+              </a:endParaRPr>
+            </a:p>
+          </p:txBody>
+        </p:sp>
+        <p:sp>
+          <p:nvSpPr>
+            <p:cNvPr id="18" name="TextBox 17"/>
+            <p:cNvSpPr txBox="1"/>
+            <p:nvPr/>
+          </p:nvSpPr>
+          <p:spPr>
+            <a:xfrm>
+              <a:off x="188780" y="-22510"/>
+              <a:ext cx="3803996" cy="303520"/>
+            </a:xfrm>
+            <a:prstGeom prst="rect">
+              <a:avLst/>
+            </a:prstGeom>
+            <a:noFill/>
+          </p:spPr>
+          <p:txBody>
+            <a:bodyPr wrap="none" rtlCol="0">
+              <a:spAutoFit/>
+            </a:bodyPr>
+            <a:lstStyle/>
+            <a:p>
+              <a:r>
+                <a:rPr lang="en-US" sz="1400" b="1" i="1" dirty="0" smtClean="0">
+                  <a:solidFill>
+                    <a:schemeClr val="tx1">
+                      <a:lumMod val="65000"/>
+                      <a:lumOff val="35000"/>
+                    </a:schemeClr>
+                  </a:solidFill>
+                  <a:latin typeface="+mj-lt"/>
+                </a:rPr>
+                <a:t>Lecture 7  </a:t>
+              </a:r>
+              <a:r>
+                <a:rPr lang="en-US" sz="1400" b="1" i="1" dirty="0">
+                  <a:solidFill>
+                    <a:schemeClr val="tx1">
+                      <a:lumMod val="65000"/>
+                      <a:lumOff val="35000"/>
+                    </a:schemeClr>
+                  </a:solidFill>
+                  <a:latin typeface="+mj-lt"/>
+                </a:rPr>
+                <a:t>&gt;  </a:t>
+              </a:r>
+              <a:r>
+                <a:rPr lang="en-US" sz="1400" b="1" i="1" dirty="0" smtClean="0">
+                  <a:solidFill>
+                    <a:schemeClr val="tx1">
+                      <a:lumMod val="65000"/>
+                      <a:lumOff val="35000"/>
+                    </a:schemeClr>
+                  </a:solidFill>
+                  <a:latin typeface="+mj-lt"/>
+                </a:rPr>
+                <a:t>Section 2  </a:t>
+              </a:r>
+              <a:r>
+                <a:rPr lang="en-US" sz="1400" b="1" i="1" dirty="0">
+                  <a:solidFill>
+                    <a:schemeClr val="tx1">
+                      <a:lumMod val="65000"/>
+                      <a:lumOff val="35000"/>
+                    </a:schemeClr>
+                  </a:solidFill>
+                  <a:latin typeface="+mj-lt"/>
+                </a:rPr>
+                <a:t>&gt;  </a:t>
+              </a:r>
+              <a:r>
+                <a:rPr lang="en-US" sz="1400" b="1" i="1" dirty="0" smtClean="0">
+                  <a:solidFill>
+                    <a:schemeClr val="tx1">
+                      <a:lumMod val="65000"/>
+                      <a:lumOff val="35000"/>
+                    </a:schemeClr>
+                  </a:solidFill>
+                  <a:latin typeface="+mj-lt"/>
+                </a:rPr>
+                <a:t>ACTIVITY  &gt;  SOLUTIONS</a:t>
+              </a:r>
+              <a:endParaRPr lang="en-US" sz="1400" b="1" i="1" dirty="0">
+                <a:solidFill>
+                  <a:schemeClr val="tx1">
+                    <a:lumMod val="65000"/>
+                    <a:lumOff val="35000"/>
+                  </a:schemeClr>
+                </a:solidFill>
+                <a:latin typeface="+mj-lt"/>
+              </a:endParaRPr>
+            </a:p>
+          </p:txBody>
+        </p:sp>
+      </p:grpSp>
+      <p:grpSp>
+        <p:nvGrpSpPr>
+          <p:cNvPr id="6" name="Group 5"/>
+          <p:cNvGrpSpPr/>
+          <p:nvPr/>
+        </p:nvGrpSpPr>
+        <p:grpSpPr>
+          <a:xfrm>
+            <a:off x="5366161" y="892468"/>
+            <a:ext cx="1149590" cy="531005"/>
+            <a:chOff x="5366161" y="892468"/>
+            <a:chExt cx="1149590" cy="531005"/>
+          </a:xfrm>
+        </p:grpSpPr>
+        <p:sp>
+          <p:nvSpPr>
+            <p:cNvPr id="19" name="Oval 13"/>
+            <p:cNvSpPr>
+              <a:spLocks noChangeArrowheads="1"/>
+            </p:cNvSpPr>
+            <p:nvPr/>
+          </p:nvSpPr>
+          <p:spPr bwMode="auto">
+            <a:xfrm>
+              <a:off x="5366161" y="892468"/>
+              <a:ext cx="1149590" cy="531005"/>
+            </a:xfrm>
+            <a:prstGeom prst="ellipse">
+              <a:avLst/>
+            </a:prstGeom>
+            <a:solidFill>
+              <a:srgbClr val="00FF00"/>
+            </a:solidFill>
+            <a:ln w="9525">
+              <a:solidFill>
+                <a:schemeClr val="tx1"/>
+              </a:solidFill>
+              <a:round/>
+              <a:headEnd/>
+              <a:tailEnd/>
+            </a:ln>
+          </p:spPr>
+          <p:txBody>
+            <a:bodyPr wrap="none" anchor="ctr">
+              <a:prstTxWarp prst="textNoShape">
+                <a:avLst/>
+              </a:prstTxWarp>
+            </a:bodyPr>
+            <a:lstStyle/>
+            <a:p>
+              <a:pPr algn="ctr" eaLnBrk="0" fontAlgn="base" hangingPunct="0">
+                <a:spcBef>
+                  <a:spcPct val="0"/>
+                </a:spcBef>
+                <a:spcAft>
+                  <a:spcPct val="0"/>
+                </a:spcAft>
+              </a:pPr>
+              <a:r>
+                <a:rPr lang="en-US" sz="1200" dirty="0">
+                  <a:solidFill>
+                    <a:srgbClr val="000000"/>
+                  </a:solidFill>
+                </a:rPr>
+                <a:t>Team </a:t>
+              </a:r>
+              <a:r>
+                <a:rPr lang="en-US" sz="1200" dirty="0" smtClean="0">
+                  <a:solidFill>
+                    <a:srgbClr val="000000"/>
+                  </a:solidFill>
+                </a:rPr>
+                <a:t>Name</a:t>
+              </a:r>
+              <a:endParaRPr lang="en-US" sz="1200" dirty="0">
+                <a:solidFill>
+                  <a:srgbClr val="000000"/>
+                </a:solidFill>
+              </a:endParaRPr>
+            </a:p>
+          </p:txBody>
+        </p:sp>
+        <p:cxnSp>
+          <p:nvCxnSpPr>
+            <p:cNvPr id="4" name="Straight Connector 3"/>
+            <p:cNvCxnSpPr/>
+            <p:nvPr/>
+          </p:nvCxnSpPr>
+          <p:spPr>
+            <a:xfrm>
+              <a:off x="5534515" y="1263728"/>
+              <a:ext cx="812882" cy="0"/>
+            </a:xfrm>
+            <a:prstGeom prst="line">
+              <a:avLst/>
+            </a:prstGeom>
+            <a:ln>
+              <a:solidFill>
+                <a:schemeClr val="tx1"/>
+              </a:solidFill>
+              <a:prstDash val="dash"/>
+            </a:ln>
+          </p:spPr>
+          <p:style>
+            <a:lnRef idx="1">
+              <a:schemeClr val="accent1"/>
+            </a:lnRef>
+            <a:fillRef idx="0">
+              <a:schemeClr val="accent1"/>
+            </a:fillRef>
+            <a:effectRef idx="0">
+              <a:schemeClr val="accent1"/>
+            </a:effectRef>
+            <a:fontRef idx="minor">
+              <a:schemeClr val="tx1"/>
+            </a:fontRef>
+          </p:style>
+        </p:cxnSp>
+      </p:grpSp>
+      <p:sp>
+        <p:nvSpPr>
+          <p:cNvPr id="24" name="Oval 13"/>
+          <p:cNvSpPr>
+            <a:spLocks noChangeArrowheads="1"/>
+          </p:cNvSpPr>
+          <p:nvPr/>
+        </p:nvSpPr>
+        <p:spPr bwMode="auto">
+          <a:xfrm>
+            <a:off x="5366161" y="4229929"/>
+            <a:ext cx="1149590" cy="531005"/>
+          </a:xfrm>
+          <a:prstGeom prst="ellipse">
+            <a:avLst/>
+          </a:prstGeom>
+          <a:solidFill>
+            <a:srgbClr val="00FF00"/>
+          </a:solidFill>
+          <a:ln w="9525">
+            <a:solidFill>
+              <a:schemeClr val="tx1"/>
+            </a:solidFill>
+            <a:round/>
+            <a:headEnd/>
+            <a:tailEnd/>
+          </a:ln>
+        </p:spPr>
+        <p:txBody>
+          <a:bodyPr wrap="none" anchor="ctr">
+            <a:prstTxWarp prst="textNoShape">
+              <a:avLst/>
+            </a:prstTxWarp>
+          </a:bodyPr>
+          <a:lstStyle/>
+          <a:p>
+            <a:pPr algn="ctr" eaLnBrk="0" fontAlgn="base" hangingPunct="0">
+              <a:spcBef>
+                <a:spcPct val="0"/>
+              </a:spcBef>
+              <a:spcAft>
+                <a:spcPct val="0"/>
+              </a:spcAft>
+            </a:pPr>
+            <a:r>
+              <a:rPr lang="en-US" sz="1200" u="sng" dirty="0" smtClean="0">
+                <a:solidFill>
+                  <a:srgbClr val="000000"/>
+                </a:solidFill>
+              </a:rPr>
+              <a:t>Name</a:t>
+            </a:r>
+            <a:endParaRPr lang="en-US" sz="1200" u="sng" dirty="0">
+              <a:solidFill>
+                <a:srgbClr val="000000"/>
+              </a:solidFill>
+            </a:endParaRPr>
+          </a:p>
+        </p:txBody>
+      </p:sp>
+      <p:cxnSp>
+        <p:nvCxnSpPr>
+          <p:cNvPr id="26" name="Straight Connector 25"/>
+          <p:cNvCxnSpPr>
+            <a:stCxn id="24" idx="0"/>
+            <a:endCxn id="111" idx="2"/>
+          </p:cNvCxnSpPr>
+          <p:nvPr/>
+        </p:nvCxnSpPr>
+        <p:spPr bwMode="auto">
+          <a:xfrm flipV="1">
+            <a:off x="5940956" y="3896650"/>
+            <a:ext cx="0" cy="333279"/>
+          </a:xfrm>
+          <a:prstGeom prst="line">
+            <a:avLst/>
+          </a:prstGeom>
+          <a:solidFill>
+            <a:srgbClr val="C0C0C0">
+              <a:alpha val="50000"/>
+            </a:srgbClr>
+          </a:solidFill>
+          <a:ln w="9525" cap="flat" cmpd="sng" algn="ctr">
+            <a:solidFill>
+              <a:schemeClr val="tx1"/>
+            </a:solidFill>
+            <a:prstDash val="solid"/>
+            <a:round/>
+            <a:headEnd type="none" w="med" len="med"/>
+            <a:tailEnd type="none" w="med" len="med"/>
+          </a:ln>
+          <a:effectLst/>
+        </p:spPr>
+      </p:cxnSp>
+      <p:sp>
+        <p:nvSpPr>
+          <p:cNvPr id="21" name="Rectangle 20"/>
+          <p:cNvSpPr>
+            <a:spLocks noChangeArrowheads="1"/>
+          </p:cNvSpPr>
+          <p:nvPr/>
+        </p:nvSpPr>
+        <p:spPr bwMode="auto">
+          <a:xfrm>
+            <a:off x="2501676" y="1943742"/>
+            <a:ext cx="968076" cy="413004"/>
+          </a:xfrm>
+          <a:prstGeom prst="rect">
+            <a:avLst/>
+          </a:prstGeom>
+          <a:solidFill>
+            <a:schemeClr val="accent2">
+              <a:lumMod val="20000"/>
+              <a:lumOff val="80000"/>
+            </a:schemeClr>
+          </a:solidFill>
+          <a:ln w="9525">
+            <a:solidFill>
+              <a:schemeClr val="tx1"/>
+            </a:solidFill>
+            <a:miter lim="800000"/>
+            <a:headEnd/>
+            <a:tailEnd/>
+          </a:ln>
+        </p:spPr>
+        <p:txBody>
+          <a:bodyPr wrap="none" anchor="ctr">
+            <a:prstTxWarp prst="textNoShape">
+              <a:avLst/>
+            </a:prstTxWarp>
+          </a:bodyPr>
+          <a:lstStyle/>
+          <a:p>
+            <a:pPr algn="ctr" eaLnBrk="0" fontAlgn="base" hangingPunct="0">
+              <a:spcBef>
+                <a:spcPct val="0"/>
+              </a:spcBef>
+              <a:spcAft>
+                <a:spcPct val="0"/>
+              </a:spcAft>
+            </a:pPr>
+            <a:r>
+              <a:rPr lang="en-US" sz="1200" dirty="0">
+                <a:solidFill>
+                  <a:srgbClr val="000000"/>
+                </a:solidFill>
+              </a:rPr>
+              <a:t>Players</a:t>
+            </a:r>
+          </a:p>
+        </p:txBody>
+      </p:sp>
+      <p:sp>
+        <p:nvSpPr>
+          <p:cNvPr id="22" name="Oval 12"/>
+          <p:cNvSpPr>
+            <a:spLocks noChangeArrowheads="1"/>
+          </p:cNvSpPr>
+          <p:nvPr/>
+        </p:nvSpPr>
+        <p:spPr bwMode="auto">
+          <a:xfrm>
+            <a:off x="1749816" y="1015938"/>
+            <a:ext cx="1149590" cy="531005"/>
+          </a:xfrm>
+          <a:prstGeom prst="ellipse">
+            <a:avLst/>
+          </a:prstGeom>
+          <a:solidFill>
+            <a:srgbClr val="00FF00"/>
+          </a:solidFill>
+          <a:ln w="9525">
+            <a:solidFill>
+              <a:schemeClr val="tx1"/>
+            </a:solidFill>
+            <a:round/>
+            <a:headEnd/>
+            <a:tailEnd/>
+          </a:ln>
+        </p:spPr>
+        <p:txBody>
+          <a:bodyPr wrap="none" anchor="ctr">
+            <a:prstTxWarp prst="textNoShape">
+              <a:avLst/>
+            </a:prstTxWarp>
+          </a:bodyPr>
+          <a:lstStyle/>
+          <a:p>
+            <a:pPr algn="ctr" eaLnBrk="0" fontAlgn="base" hangingPunct="0">
+              <a:spcBef>
+                <a:spcPct val="0"/>
+              </a:spcBef>
+              <a:spcAft>
+                <a:spcPct val="0"/>
+              </a:spcAft>
+            </a:pPr>
+            <a:r>
+              <a:rPr lang="en-US" sz="1200" dirty="0">
+                <a:solidFill>
+                  <a:srgbClr val="000000"/>
+                </a:solidFill>
+              </a:rPr>
+              <a:t>name</a:t>
+            </a:r>
+          </a:p>
+        </p:txBody>
+      </p:sp>
+      <p:cxnSp>
+        <p:nvCxnSpPr>
+          <p:cNvPr id="23" name="Straight Connector 22"/>
+          <p:cNvCxnSpPr/>
+          <p:nvPr/>
+        </p:nvCxnSpPr>
+        <p:spPr bwMode="auto">
+          <a:xfrm>
+            <a:off x="2345017" y="1534891"/>
+            <a:ext cx="661103" cy="396800"/>
+          </a:xfrm>
+          <a:prstGeom prst="line">
+            <a:avLst/>
+          </a:prstGeom>
+          <a:solidFill>
+            <a:srgbClr val="C0C0C0">
+              <a:alpha val="50000"/>
+            </a:srgbClr>
+          </a:solidFill>
+          <a:ln w="9525" cap="flat" cmpd="sng" algn="ctr">
+            <a:solidFill>
+              <a:schemeClr val="tx1"/>
+            </a:solidFill>
+            <a:prstDash val="solid"/>
+            <a:round/>
+            <a:headEnd type="none" w="med" len="med"/>
+            <a:tailEnd type="none" w="med" len="med"/>
+          </a:ln>
+          <a:effectLst/>
+        </p:spPr>
+      </p:cxnSp>
+      <p:sp>
+        <p:nvSpPr>
+          <p:cNvPr id="27" name="AutoShape 8"/>
+          <p:cNvSpPr>
+            <a:spLocks noChangeArrowheads="1"/>
+          </p:cNvSpPr>
+          <p:nvPr/>
+        </p:nvSpPr>
+        <p:spPr bwMode="auto">
+          <a:xfrm>
+            <a:off x="3887861" y="1757359"/>
+            <a:ext cx="1262054" cy="531005"/>
+          </a:xfrm>
+          <a:prstGeom prst="diamond">
+            <a:avLst/>
+          </a:prstGeom>
+          <a:solidFill>
+            <a:schemeClr val="accent1"/>
+          </a:solidFill>
+          <a:ln w="9525">
+            <a:solidFill>
+              <a:schemeClr val="tx1"/>
+            </a:solidFill>
+            <a:miter lim="800000"/>
+            <a:headEnd/>
+            <a:tailEnd/>
+          </a:ln>
+        </p:spPr>
+        <p:txBody>
+          <a:bodyPr wrap="none" anchor="ctr">
+            <a:prstTxWarp prst="textNoShape">
+              <a:avLst/>
+            </a:prstTxWarp>
+          </a:bodyPr>
+          <a:lstStyle/>
+          <a:p>
+            <a:pPr algn="ctr" eaLnBrk="0" fontAlgn="base" hangingPunct="0">
+              <a:spcBef>
+                <a:spcPct val="0"/>
+              </a:spcBef>
+              <a:spcAft>
+                <a:spcPct val="0"/>
+              </a:spcAft>
+            </a:pPr>
+            <a:r>
+              <a:rPr lang="en-US" sz="1200" dirty="0" err="1" smtClean="0">
+                <a:solidFill>
+                  <a:srgbClr val="000000"/>
+                </a:solidFill>
+              </a:rPr>
+              <a:t>MemberOf</a:t>
+            </a:r>
+            <a:endParaRPr lang="en-US" sz="1200" dirty="0">
+              <a:solidFill>
+                <a:srgbClr val="000000"/>
+              </a:solidFill>
+            </a:endParaRPr>
+          </a:p>
+        </p:txBody>
+      </p:sp>
+      <p:sp>
+        <p:nvSpPr>
+          <p:cNvPr id="28" name="Oval 13"/>
+          <p:cNvSpPr>
+            <a:spLocks noChangeArrowheads="1"/>
+          </p:cNvSpPr>
+          <p:nvPr/>
+        </p:nvSpPr>
+        <p:spPr bwMode="auto">
+          <a:xfrm>
+            <a:off x="2985714" y="1042864"/>
+            <a:ext cx="1149590" cy="531005"/>
+          </a:xfrm>
+          <a:prstGeom prst="ellipse">
+            <a:avLst/>
+          </a:prstGeom>
+          <a:solidFill>
+            <a:srgbClr val="00FF00"/>
+          </a:solidFill>
+          <a:ln w="9525">
+            <a:solidFill>
+              <a:schemeClr val="tx1"/>
+            </a:solidFill>
+            <a:round/>
+            <a:headEnd/>
+            <a:tailEnd/>
+          </a:ln>
+        </p:spPr>
+        <p:txBody>
+          <a:bodyPr wrap="none" anchor="ctr">
+            <a:prstTxWarp prst="textNoShape">
+              <a:avLst/>
+            </a:prstTxWarp>
+          </a:bodyPr>
+          <a:lstStyle/>
+          <a:p>
+            <a:pPr algn="ctr" eaLnBrk="0" fontAlgn="base" hangingPunct="0">
+              <a:spcBef>
+                <a:spcPct val="0"/>
+              </a:spcBef>
+              <a:spcAft>
+                <a:spcPct val="0"/>
+              </a:spcAft>
+            </a:pPr>
+            <a:r>
+              <a:rPr lang="en-US" sz="1200" u="sng" dirty="0">
+                <a:solidFill>
+                  <a:srgbClr val="000000"/>
+                </a:solidFill>
+              </a:rPr>
+              <a:t>Player ID</a:t>
+            </a:r>
+          </a:p>
+        </p:txBody>
+      </p:sp>
+      <p:cxnSp>
+        <p:nvCxnSpPr>
+          <p:cNvPr id="29" name="Straight Connector 28"/>
+          <p:cNvCxnSpPr/>
+          <p:nvPr/>
+        </p:nvCxnSpPr>
+        <p:spPr bwMode="auto">
+          <a:xfrm flipH="1">
+            <a:off x="2985715" y="1573868"/>
+            <a:ext cx="574795" cy="369874"/>
+          </a:xfrm>
+          <a:prstGeom prst="line">
+            <a:avLst/>
+          </a:prstGeom>
+          <a:solidFill>
+            <a:srgbClr val="C0C0C0">
+              <a:alpha val="50000"/>
+            </a:srgbClr>
+          </a:solidFill>
+          <a:ln w="9525" cap="flat" cmpd="sng" algn="ctr">
+            <a:solidFill>
+              <a:schemeClr val="tx1"/>
+            </a:solidFill>
+            <a:prstDash val="solid"/>
+            <a:round/>
+            <a:headEnd type="none" w="med" len="med"/>
+            <a:tailEnd type="none" w="med" len="med"/>
+          </a:ln>
+          <a:effectLst/>
+        </p:spPr>
+      </p:cxnSp>
+      <p:sp>
+        <p:nvSpPr>
+          <p:cNvPr id="30" name="AutoShape 8"/>
+          <p:cNvSpPr>
+            <a:spLocks noChangeArrowheads="1"/>
+          </p:cNvSpPr>
+          <p:nvPr/>
+        </p:nvSpPr>
+        <p:spPr bwMode="auto">
+          <a:xfrm>
+            <a:off x="1749816" y="2839405"/>
+            <a:ext cx="1262054" cy="531005"/>
+          </a:xfrm>
+          <a:prstGeom prst="diamond">
+            <a:avLst/>
+          </a:prstGeom>
+          <a:solidFill>
+            <a:schemeClr val="accent1"/>
+          </a:solidFill>
+          <a:ln w="9525">
+            <a:solidFill>
+              <a:schemeClr val="tx1"/>
+            </a:solidFill>
+            <a:miter lim="800000"/>
+            <a:headEnd/>
+            <a:tailEnd/>
+          </a:ln>
+        </p:spPr>
+        <p:txBody>
+          <a:bodyPr wrap="none" anchor="ctr">
+            <a:prstTxWarp prst="textNoShape">
+              <a:avLst/>
+            </a:prstTxWarp>
+          </a:bodyPr>
+          <a:lstStyle/>
+          <a:p>
+            <a:pPr algn="ctr" eaLnBrk="0" fontAlgn="base" hangingPunct="0">
+              <a:spcBef>
+                <a:spcPct val="0"/>
+              </a:spcBef>
+              <a:spcAft>
+                <a:spcPct val="0"/>
+              </a:spcAft>
+            </a:pPr>
+            <a:r>
+              <a:rPr lang="en-US" sz="1200" dirty="0" err="1" smtClean="0">
+                <a:solidFill>
+                  <a:srgbClr val="000000"/>
+                </a:solidFill>
+              </a:rPr>
+              <a:t>PlaysPosition</a:t>
+            </a:r>
+            <a:endParaRPr lang="en-US" sz="1200" dirty="0">
+              <a:solidFill>
+                <a:srgbClr val="000000"/>
+              </a:solidFill>
+            </a:endParaRPr>
+          </a:p>
+        </p:txBody>
+      </p:sp>
+      <p:sp>
+        <p:nvSpPr>
+          <p:cNvPr id="31" name="Rectangle 30"/>
+          <p:cNvSpPr>
+            <a:spLocks noChangeArrowheads="1"/>
+          </p:cNvSpPr>
+          <p:nvPr/>
+        </p:nvSpPr>
+        <p:spPr bwMode="auto">
+          <a:xfrm>
+            <a:off x="467535" y="5211078"/>
+            <a:ext cx="1101456" cy="413004"/>
+          </a:xfrm>
+          <a:prstGeom prst="rect">
+            <a:avLst/>
+          </a:prstGeom>
+          <a:solidFill>
+            <a:schemeClr val="accent2">
+              <a:lumMod val="20000"/>
+              <a:lumOff val="80000"/>
+            </a:schemeClr>
+          </a:solidFill>
+          <a:ln w="9525">
+            <a:solidFill>
+              <a:schemeClr val="tx1"/>
+            </a:solidFill>
+            <a:miter lim="800000"/>
+            <a:headEnd/>
+            <a:tailEnd/>
+          </a:ln>
+        </p:spPr>
+        <p:txBody>
+          <a:bodyPr wrap="none" anchor="ctr">
+            <a:prstTxWarp prst="textNoShape">
+              <a:avLst/>
+            </a:prstTxWarp>
+          </a:bodyPr>
+          <a:lstStyle/>
+          <a:p>
+            <a:pPr algn="ctr" eaLnBrk="0" fontAlgn="base" hangingPunct="0">
+              <a:spcBef>
+                <a:spcPct val="0"/>
+              </a:spcBef>
+              <a:spcAft>
+                <a:spcPct val="0"/>
+              </a:spcAft>
+            </a:pPr>
+            <a:r>
+              <a:rPr lang="en-US" sz="1200" smtClean="0">
+                <a:solidFill>
+                  <a:srgbClr val="000000"/>
+                </a:solidFill>
+              </a:rPr>
+              <a:t>OffensePosition</a:t>
+            </a:r>
+            <a:endParaRPr lang="en-US" sz="1200" dirty="0">
+              <a:solidFill>
+                <a:srgbClr val="000000"/>
+              </a:solidFill>
+            </a:endParaRPr>
+          </a:p>
+        </p:txBody>
+      </p:sp>
+      <p:sp>
+        <p:nvSpPr>
+          <p:cNvPr id="32" name="Rectangle 31"/>
+          <p:cNvSpPr>
+            <a:spLocks noChangeArrowheads="1"/>
+          </p:cNvSpPr>
+          <p:nvPr/>
+        </p:nvSpPr>
+        <p:spPr bwMode="auto">
+          <a:xfrm>
+            <a:off x="1808276" y="5211078"/>
+            <a:ext cx="1177437" cy="413004"/>
+          </a:xfrm>
+          <a:prstGeom prst="rect">
+            <a:avLst/>
+          </a:prstGeom>
+          <a:solidFill>
+            <a:schemeClr val="accent2">
+              <a:lumMod val="20000"/>
+              <a:lumOff val="80000"/>
+            </a:schemeClr>
+          </a:solidFill>
+          <a:ln w="9525">
+            <a:solidFill>
+              <a:schemeClr val="tx1"/>
+            </a:solidFill>
+            <a:miter lim="800000"/>
+            <a:headEnd/>
+            <a:tailEnd/>
+          </a:ln>
+        </p:spPr>
+        <p:txBody>
+          <a:bodyPr wrap="none" anchor="ctr">
+            <a:prstTxWarp prst="textNoShape">
+              <a:avLst/>
+            </a:prstTxWarp>
+          </a:bodyPr>
+          <a:lstStyle/>
+          <a:p>
+            <a:pPr algn="ctr" eaLnBrk="0" fontAlgn="base" hangingPunct="0">
+              <a:spcBef>
+                <a:spcPct val="0"/>
+              </a:spcBef>
+              <a:spcAft>
+                <a:spcPct val="0"/>
+              </a:spcAft>
+            </a:pPr>
+            <a:r>
+              <a:rPr lang="en-US" sz="1200" dirty="0" err="1" smtClean="0">
+                <a:solidFill>
+                  <a:srgbClr val="000000"/>
+                </a:solidFill>
+              </a:rPr>
+              <a:t>DefensePosition</a:t>
+            </a:r>
+            <a:endParaRPr lang="en-US" sz="1200" dirty="0">
+              <a:solidFill>
+                <a:srgbClr val="000000"/>
+              </a:solidFill>
+            </a:endParaRPr>
+          </a:p>
+        </p:txBody>
+      </p:sp>
+      <p:sp>
+        <p:nvSpPr>
+          <p:cNvPr id="33" name="Rectangle 32"/>
+          <p:cNvSpPr>
+            <a:spLocks noChangeArrowheads="1"/>
+          </p:cNvSpPr>
+          <p:nvPr/>
+        </p:nvSpPr>
+        <p:spPr bwMode="auto">
+          <a:xfrm>
+            <a:off x="1190859" y="3563141"/>
+            <a:ext cx="968076" cy="413004"/>
+          </a:xfrm>
+          <a:prstGeom prst="rect">
+            <a:avLst/>
+          </a:prstGeom>
+          <a:solidFill>
+            <a:schemeClr val="accent2">
+              <a:lumMod val="20000"/>
+              <a:lumOff val="80000"/>
+            </a:schemeClr>
+          </a:solidFill>
+          <a:ln w="9525">
+            <a:solidFill>
+              <a:schemeClr val="tx1"/>
+            </a:solidFill>
+            <a:miter lim="800000"/>
+            <a:headEnd/>
+            <a:tailEnd/>
+          </a:ln>
+        </p:spPr>
+        <p:txBody>
+          <a:bodyPr wrap="none" anchor="ctr">
+            <a:prstTxWarp prst="textNoShape">
+              <a:avLst/>
+            </a:prstTxWarp>
+          </a:bodyPr>
+          <a:lstStyle/>
+          <a:p>
+            <a:pPr algn="ctr" eaLnBrk="0" fontAlgn="base" hangingPunct="0">
+              <a:spcBef>
+                <a:spcPct val="0"/>
+              </a:spcBef>
+              <a:spcAft>
+                <a:spcPct val="0"/>
+              </a:spcAft>
+            </a:pPr>
+            <a:r>
+              <a:rPr lang="en-US" sz="1200" dirty="0" smtClean="0">
+                <a:solidFill>
+                  <a:srgbClr val="000000"/>
+                </a:solidFill>
+              </a:rPr>
+              <a:t>Position</a:t>
+            </a:r>
+            <a:endParaRPr lang="en-US" sz="1200" dirty="0">
+              <a:solidFill>
+                <a:srgbClr val="000000"/>
+              </a:solidFill>
+            </a:endParaRPr>
+          </a:p>
+        </p:txBody>
+      </p:sp>
+      <p:sp>
+        <p:nvSpPr>
+          <p:cNvPr id="34" name="AutoShape 10"/>
+          <p:cNvSpPr>
+            <a:spLocks noChangeAspect="1" noChangeArrowheads="1"/>
+          </p:cNvSpPr>
+          <p:nvPr/>
+        </p:nvSpPr>
+        <p:spPr bwMode="auto">
+          <a:xfrm>
+            <a:off x="1378932" y="4256813"/>
+            <a:ext cx="591931" cy="500674"/>
+          </a:xfrm>
+          <a:prstGeom prst="triangle">
+            <a:avLst>
+              <a:gd name="adj" fmla="val 50000"/>
+            </a:avLst>
+          </a:prstGeom>
+          <a:solidFill>
+            <a:srgbClr val="00B0F0"/>
+          </a:solidFill>
+          <a:ln w="9525">
+            <a:solidFill>
+              <a:schemeClr val="tx1"/>
+            </a:solidFill>
+            <a:miter lim="800000"/>
+            <a:headEnd/>
+            <a:tailEnd/>
+          </a:ln>
+        </p:spPr>
+        <p:txBody>
+          <a:bodyPr wrap="none" anchor="ctr">
+            <a:prstTxWarp prst="textNoShape">
+              <a:avLst/>
+            </a:prstTxWarp>
+          </a:bodyPr>
+          <a:lstStyle/>
+          <a:p>
+            <a:pPr algn="ctr" eaLnBrk="0" fontAlgn="base" hangingPunct="0">
+              <a:spcBef>
+                <a:spcPct val="0"/>
+              </a:spcBef>
+              <a:spcAft>
+                <a:spcPct val="0"/>
+              </a:spcAft>
+            </a:pPr>
+            <a:r>
+              <a:rPr lang="en-US" dirty="0" err="1">
+                <a:solidFill>
+                  <a:srgbClr val="000000"/>
+                </a:solidFill>
+              </a:rPr>
+              <a:t>isa</a:t>
+            </a:r>
+            <a:endParaRPr lang="en-US" dirty="0">
+              <a:solidFill>
+                <a:srgbClr val="000000"/>
+              </a:solidFill>
+            </a:endParaRPr>
+          </a:p>
+        </p:txBody>
+      </p:sp>
+      <p:cxnSp>
+        <p:nvCxnSpPr>
+          <p:cNvPr id="35" name="Straight Connector 34"/>
+          <p:cNvCxnSpPr>
+            <a:stCxn id="30" idx="2"/>
+          </p:cNvCxnSpPr>
+          <p:nvPr/>
+        </p:nvCxnSpPr>
+        <p:spPr bwMode="auto">
+          <a:xfrm flipH="1">
+            <a:off x="1674898" y="3370410"/>
+            <a:ext cx="705945" cy="192731"/>
+          </a:xfrm>
+          <a:prstGeom prst="line">
+            <a:avLst/>
+          </a:prstGeom>
+          <a:solidFill>
+            <a:srgbClr val="C0C0C0">
+              <a:alpha val="50000"/>
+            </a:srgbClr>
+          </a:solidFill>
+          <a:ln w="9525" cap="flat" cmpd="sng" algn="ctr">
+            <a:solidFill>
+              <a:schemeClr val="tx1"/>
+            </a:solidFill>
+            <a:prstDash val="solid"/>
+            <a:round/>
+            <a:headEnd type="none" w="med" len="med"/>
+            <a:tailEnd type="none" w="med" len="med"/>
+          </a:ln>
+          <a:effectLst/>
+        </p:spPr>
+      </p:cxnSp>
+      <p:cxnSp>
+        <p:nvCxnSpPr>
+          <p:cNvPr id="37" name="Straight Connector 36"/>
+          <p:cNvCxnSpPr/>
+          <p:nvPr/>
+        </p:nvCxnSpPr>
+        <p:spPr bwMode="auto">
+          <a:xfrm>
+            <a:off x="1674897" y="3976145"/>
+            <a:ext cx="0" cy="280668"/>
+          </a:xfrm>
+          <a:prstGeom prst="line">
+            <a:avLst/>
+          </a:prstGeom>
+          <a:solidFill>
+            <a:srgbClr val="C0C0C0">
+              <a:alpha val="50000"/>
+            </a:srgbClr>
+          </a:solidFill>
+          <a:ln w="9525" cap="flat" cmpd="sng" algn="ctr">
+            <a:solidFill>
+              <a:schemeClr val="tx1"/>
+            </a:solidFill>
+            <a:prstDash val="solid"/>
+            <a:round/>
+            <a:headEnd type="none" w="med" len="med"/>
+            <a:tailEnd type="none" w="med" len="med"/>
+          </a:ln>
+          <a:effectLst/>
+        </p:spPr>
+      </p:cxnSp>
+      <p:cxnSp>
+        <p:nvCxnSpPr>
+          <p:cNvPr id="38" name="Straight Connector 37"/>
+          <p:cNvCxnSpPr/>
+          <p:nvPr/>
+        </p:nvCxnSpPr>
+        <p:spPr bwMode="auto">
+          <a:xfrm flipH="1">
+            <a:off x="1084953" y="4757488"/>
+            <a:ext cx="589944" cy="453591"/>
+          </a:xfrm>
+          <a:prstGeom prst="line">
+            <a:avLst/>
+          </a:prstGeom>
+          <a:solidFill>
+            <a:srgbClr val="C0C0C0">
+              <a:alpha val="50000"/>
+            </a:srgbClr>
+          </a:solidFill>
+          <a:ln w="9525" cap="flat" cmpd="sng" algn="ctr">
+            <a:solidFill>
+              <a:schemeClr val="tx1"/>
+            </a:solidFill>
+            <a:prstDash val="solid"/>
+            <a:round/>
+            <a:headEnd type="none" w="med" len="med"/>
+            <a:tailEnd type="none" w="med" len="med"/>
+          </a:ln>
+          <a:effectLst/>
+        </p:spPr>
+      </p:cxnSp>
+      <p:cxnSp>
+        <p:nvCxnSpPr>
+          <p:cNvPr id="39" name="Straight Connector 38"/>
+          <p:cNvCxnSpPr/>
+          <p:nvPr/>
+        </p:nvCxnSpPr>
+        <p:spPr bwMode="auto">
+          <a:xfrm>
+            <a:off x="1674897" y="4757488"/>
+            <a:ext cx="617418" cy="453591"/>
+          </a:xfrm>
+          <a:prstGeom prst="line">
+            <a:avLst/>
+          </a:prstGeom>
+          <a:solidFill>
+            <a:srgbClr val="C0C0C0">
+              <a:alpha val="50000"/>
+            </a:srgbClr>
+          </a:solidFill>
+          <a:ln w="9525" cap="flat" cmpd="sng" algn="ctr">
+            <a:solidFill>
+              <a:schemeClr val="tx1"/>
+            </a:solidFill>
+            <a:prstDash val="solid"/>
+            <a:round/>
+            <a:headEnd type="none" w="med" len="med"/>
+            <a:tailEnd type="none" w="med" len="med"/>
+          </a:ln>
+          <a:effectLst/>
+        </p:spPr>
+      </p:cxnSp>
+      <p:cxnSp>
+        <p:nvCxnSpPr>
+          <p:cNvPr id="40" name="Straight Connector 39"/>
+          <p:cNvCxnSpPr>
+            <a:endCxn id="59" idx="0"/>
+          </p:cNvCxnSpPr>
+          <p:nvPr/>
+        </p:nvCxnSpPr>
+        <p:spPr bwMode="auto">
+          <a:xfrm flipH="1">
+            <a:off x="873725" y="5624082"/>
+            <a:ext cx="211230" cy="528118"/>
+          </a:xfrm>
+          <a:prstGeom prst="line">
+            <a:avLst/>
+          </a:prstGeom>
+          <a:solidFill>
+            <a:srgbClr val="C0C0C0">
+              <a:alpha val="50000"/>
+            </a:srgbClr>
+          </a:solidFill>
+          <a:ln w="9525" cap="flat" cmpd="sng" algn="ctr">
+            <a:solidFill>
+              <a:schemeClr val="tx1"/>
+            </a:solidFill>
+            <a:prstDash val="solid"/>
+            <a:round/>
+            <a:headEnd type="none" w="med" len="med"/>
+            <a:tailEnd type="none" w="med" len="med"/>
+          </a:ln>
+          <a:effectLst/>
+        </p:spPr>
+      </p:cxnSp>
+      <p:cxnSp>
+        <p:nvCxnSpPr>
+          <p:cNvPr id="41" name="Straight Connector 40"/>
+          <p:cNvCxnSpPr/>
+          <p:nvPr/>
+        </p:nvCxnSpPr>
+        <p:spPr bwMode="auto">
+          <a:xfrm>
+            <a:off x="2292317" y="5624082"/>
+            <a:ext cx="248844" cy="449904"/>
+          </a:xfrm>
+          <a:prstGeom prst="line">
+            <a:avLst/>
+          </a:prstGeom>
+          <a:solidFill>
+            <a:srgbClr val="C0C0C0">
+              <a:alpha val="50000"/>
+            </a:srgbClr>
+          </a:solidFill>
+          <a:ln w="9525" cap="flat" cmpd="sng" algn="ctr">
+            <a:solidFill>
+              <a:schemeClr val="tx1"/>
+            </a:solidFill>
+            <a:prstDash val="solid"/>
+            <a:round/>
+            <a:headEnd type="none" w="med" len="med"/>
+            <a:tailEnd type="none" w="med" len="med"/>
+          </a:ln>
+          <a:effectLst/>
+        </p:spPr>
+      </p:cxnSp>
+      <p:cxnSp>
+        <p:nvCxnSpPr>
+          <p:cNvPr id="42" name="Straight Connector 41"/>
+          <p:cNvCxnSpPr/>
+          <p:nvPr/>
+        </p:nvCxnSpPr>
+        <p:spPr>
+          <a:xfrm flipH="1">
+            <a:off x="2407000" y="2356746"/>
+            <a:ext cx="604871" cy="482658"/>
+          </a:xfrm>
+          <a:prstGeom prst="line">
+            <a:avLst/>
+          </a:prstGeom>
+          <a:ln w="28575" cmpd="sng">
+            <a:solidFill>
+              <a:srgbClr val="000000"/>
+            </a:solidFill>
+            <a:tailEnd type="triangle"/>
+          </a:ln>
+        </p:spPr>
+        <p:style>
+          <a:lnRef idx="2">
+            <a:schemeClr val="accent1"/>
+          </a:lnRef>
+          <a:fillRef idx="0">
+            <a:schemeClr val="accent1"/>
+          </a:fillRef>
+          <a:effectRef idx="1">
+            <a:schemeClr val="accent1"/>
+          </a:effectRef>
+          <a:fontRef idx="minor">
+            <a:schemeClr val="tx1"/>
+          </a:fontRef>
+        </p:style>
+      </p:cxnSp>
+      <p:cxnSp>
+        <p:nvCxnSpPr>
+          <p:cNvPr id="43" name="Straight Arrow Connector 42"/>
+          <p:cNvCxnSpPr>
+            <a:endCxn id="45" idx="1"/>
+          </p:cNvCxnSpPr>
+          <p:nvPr/>
+        </p:nvCxnSpPr>
+        <p:spPr>
+          <a:xfrm flipV="1">
+            <a:off x="3469753" y="2022862"/>
+            <a:ext cx="418109" cy="127383"/>
+          </a:xfrm>
+          <a:prstGeom prst="straightConnector1">
+            <a:avLst/>
+          </a:prstGeom>
+          <a:ln w="28575" cmpd="sng">
+            <a:solidFill>
+              <a:srgbClr val="000000"/>
+            </a:solidFill>
+            <a:headEnd type="none"/>
+            <a:tailEnd type="triangle"/>
+          </a:ln>
+        </p:spPr>
+        <p:style>
+          <a:lnRef idx="2">
+            <a:schemeClr val="accent1"/>
+          </a:lnRef>
+          <a:fillRef idx="0">
+            <a:schemeClr val="accent1"/>
+          </a:fillRef>
+          <a:effectRef idx="1">
+            <a:schemeClr val="accent1"/>
+          </a:effectRef>
+          <a:fontRef idx="minor">
+            <a:schemeClr val="tx1"/>
+          </a:fontRef>
+        </p:style>
+      </p:cxnSp>
+      <p:sp>
+        <p:nvSpPr>
+          <p:cNvPr id="45" name="TextBox 44"/>
+          <p:cNvSpPr txBox="1"/>
+          <p:nvPr/>
+        </p:nvSpPr>
+        <p:spPr>
+          <a:xfrm>
+            <a:off x="7525819" y="4520984"/>
+            <a:ext cx="2217173" cy="1631216"/>
+          </a:xfrm>
+          <a:prstGeom prst="rect">
+            <a:avLst/>
+          </a:prstGeom>
+          <a:noFill/>
+        </p:spPr>
+        <p:txBody>
+          <a:bodyPr wrap="square" rtlCol="0">
+            <a:spAutoFit/>
+          </a:bodyPr>
+          <a:lstStyle/>
+          <a:p>
+            <a:r>
+              <a:rPr lang="en-US" sz="2000" dirty="0">
+                <a:latin typeface="+mj-lt"/>
+              </a:rPr>
+              <a:t>Players are either on Offense or Defense, and are of types (QB, RB, WR, </a:t>
+            </a:r>
+            <a:r>
+              <a:rPr lang="en-US" sz="2000" dirty="0" smtClean="0">
+                <a:latin typeface="+mj-lt"/>
+              </a:rPr>
+              <a:t>TE)</a:t>
+            </a:r>
+            <a:endParaRPr lang="en-US" sz="2000" dirty="0">
+              <a:latin typeface="+mj-lt"/>
+            </a:endParaRPr>
+          </a:p>
+        </p:txBody>
+      </p:sp>
+      <p:cxnSp>
+        <p:nvCxnSpPr>
+          <p:cNvPr id="46" name="Straight Connector 45"/>
+          <p:cNvCxnSpPr>
+            <a:stCxn id="27" idx="3"/>
+            <a:endCxn id="16" idx="1"/>
+          </p:cNvCxnSpPr>
+          <p:nvPr/>
+        </p:nvCxnSpPr>
+        <p:spPr bwMode="auto">
+          <a:xfrm flipV="1">
+            <a:off x="5149915" y="1963860"/>
+            <a:ext cx="307003" cy="59002"/>
+          </a:xfrm>
+          <a:prstGeom prst="line">
+            <a:avLst/>
+          </a:prstGeom>
+          <a:solidFill>
+            <a:srgbClr val="C0C0C0">
+              <a:alpha val="50000"/>
+            </a:srgbClr>
+          </a:solidFill>
+          <a:ln w="9525" cap="flat" cmpd="sng" algn="ctr">
+            <a:solidFill>
+              <a:schemeClr val="tx1"/>
+            </a:solidFill>
+            <a:prstDash val="solid"/>
+            <a:round/>
+            <a:headEnd type="none" w="med" len="med"/>
+            <a:tailEnd type="none" w="med" len="med"/>
+          </a:ln>
+          <a:effectLst/>
+        </p:spPr>
+      </p:cxnSp>
+      <p:sp>
+        <p:nvSpPr>
+          <p:cNvPr id="50" name="Oval 13"/>
+          <p:cNvSpPr>
+            <a:spLocks noChangeArrowheads="1"/>
+          </p:cNvSpPr>
+          <p:nvPr/>
+        </p:nvSpPr>
+        <p:spPr bwMode="auto">
+          <a:xfrm>
+            <a:off x="3153053" y="3903093"/>
+            <a:ext cx="1149590" cy="531005"/>
+          </a:xfrm>
+          <a:prstGeom prst="ellipse">
+            <a:avLst/>
+          </a:prstGeom>
+          <a:solidFill>
+            <a:srgbClr val="00FF00"/>
+          </a:solidFill>
+          <a:ln w="9525">
+            <a:solidFill>
+              <a:schemeClr val="tx1"/>
+            </a:solidFill>
+            <a:round/>
+            <a:headEnd/>
+            <a:tailEnd/>
+          </a:ln>
+        </p:spPr>
+        <p:txBody>
+          <a:bodyPr wrap="none" anchor="ctr">
+            <a:prstTxWarp prst="textNoShape">
+              <a:avLst/>
+            </a:prstTxWarp>
+          </a:bodyPr>
+          <a:lstStyle/>
+          <a:p>
+            <a:pPr algn="ctr" eaLnBrk="0" fontAlgn="base" hangingPunct="0">
+              <a:spcBef>
+                <a:spcPct val="0"/>
+              </a:spcBef>
+              <a:spcAft>
+                <a:spcPct val="0"/>
+              </a:spcAft>
+            </a:pPr>
+            <a:r>
+              <a:rPr lang="en-US" sz="1200" u="sng" dirty="0" smtClean="0">
+                <a:solidFill>
+                  <a:srgbClr val="000000"/>
+                </a:solidFill>
+              </a:rPr>
+              <a:t>String</a:t>
+            </a:r>
+            <a:endParaRPr lang="en-US" sz="1200" u="sng" dirty="0">
+              <a:solidFill>
+                <a:srgbClr val="000000"/>
+              </a:solidFill>
+            </a:endParaRPr>
+          </a:p>
+        </p:txBody>
+      </p:sp>
+      <p:cxnSp>
+        <p:nvCxnSpPr>
+          <p:cNvPr id="51" name="Straight Connector 50"/>
+          <p:cNvCxnSpPr>
+            <a:stCxn id="50" idx="2"/>
+            <a:endCxn id="33" idx="3"/>
+          </p:cNvCxnSpPr>
+          <p:nvPr/>
+        </p:nvCxnSpPr>
+        <p:spPr bwMode="auto">
+          <a:xfrm flipH="1" flipV="1">
+            <a:off x="2158935" y="3769643"/>
+            <a:ext cx="994118" cy="398953"/>
+          </a:xfrm>
+          <a:prstGeom prst="line">
+            <a:avLst/>
+          </a:prstGeom>
+          <a:solidFill>
+            <a:srgbClr val="C0C0C0">
+              <a:alpha val="50000"/>
+            </a:srgbClr>
+          </a:solidFill>
+          <a:ln w="9525" cap="flat" cmpd="sng" algn="ctr">
+            <a:solidFill>
+              <a:schemeClr val="tx1"/>
+            </a:solidFill>
+            <a:prstDash val="solid"/>
+            <a:round/>
+            <a:headEnd type="none" w="med" len="med"/>
+            <a:tailEnd type="none" w="med" len="med"/>
+          </a:ln>
+          <a:effectLst/>
+        </p:spPr>
+      </p:cxnSp>
+      <p:sp>
+        <p:nvSpPr>
+          <p:cNvPr id="53" name="Oval 13"/>
+          <p:cNvSpPr>
+            <a:spLocks noChangeArrowheads="1"/>
+          </p:cNvSpPr>
+          <p:nvPr/>
+        </p:nvSpPr>
+        <p:spPr bwMode="auto">
+          <a:xfrm>
+            <a:off x="3153053" y="3267177"/>
+            <a:ext cx="1149590" cy="531005"/>
+          </a:xfrm>
+          <a:prstGeom prst="ellipse">
+            <a:avLst/>
+          </a:prstGeom>
+          <a:solidFill>
+            <a:srgbClr val="00FF00"/>
+          </a:solidFill>
+          <a:ln w="9525">
+            <a:solidFill>
+              <a:schemeClr val="tx1"/>
+            </a:solidFill>
+            <a:round/>
+            <a:headEnd/>
+            <a:tailEnd/>
+          </a:ln>
+        </p:spPr>
+        <p:txBody>
+          <a:bodyPr wrap="none" anchor="ctr">
+            <a:prstTxWarp prst="textNoShape">
+              <a:avLst/>
+            </a:prstTxWarp>
+          </a:bodyPr>
+          <a:lstStyle/>
+          <a:p>
+            <a:pPr algn="ctr" eaLnBrk="0" fontAlgn="base" hangingPunct="0">
+              <a:spcBef>
+                <a:spcPct val="0"/>
+              </a:spcBef>
+              <a:spcAft>
+                <a:spcPct val="0"/>
+              </a:spcAft>
+            </a:pPr>
+            <a:r>
+              <a:rPr lang="en-US" sz="1200" u="sng" dirty="0" smtClean="0">
+                <a:solidFill>
+                  <a:srgbClr val="000000"/>
+                </a:solidFill>
+              </a:rPr>
+              <a:t>Type</a:t>
+            </a:r>
+            <a:endParaRPr lang="en-US" sz="1200" u="sng" dirty="0">
+              <a:solidFill>
+                <a:srgbClr val="000000"/>
+              </a:solidFill>
+            </a:endParaRPr>
+          </a:p>
+        </p:txBody>
+      </p:sp>
+      <p:cxnSp>
+        <p:nvCxnSpPr>
+          <p:cNvPr id="54" name="Straight Connector 53"/>
+          <p:cNvCxnSpPr>
+            <a:stCxn id="53" idx="2"/>
+            <a:endCxn id="33" idx="3"/>
+          </p:cNvCxnSpPr>
+          <p:nvPr/>
+        </p:nvCxnSpPr>
+        <p:spPr bwMode="auto">
+          <a:xfrm flipH="1">
+            <a:off x="2158935" y="3532680"/>
+            <a:ext cx="994118" cy="236963"/>
+          </a:xfrm>
+          <a:prstGeom prst="line">
+            <a:avLst/>
+          </a:prstGeom>
+          <a:solidFill>
+            <a:srgbClr val="C0C0C0">
+              <a:alpha val="50000"/>
+            </a:srgbClr>
+          </a:solidFill>
+          <a:ln w="9525" cap="flat" cmpd="sng" algn="ctr">
+            <a:solidFill>
+              <a:schemeClr val="tx1"/>
+            </a:solidFill>
+            <a:prstDash val="solid"/>
+            <a:round/>
+            <a:headEnd type="none" w="med" len="med"/>
+            <a:tailEnd type="none" w="med" len="med"/>
+          </a:ln>
+          <a:effectLst/>
+        </p:spPr>
+      </p:cxnSp>
+      <p:sp>
+        <p:nvSpPr>
+          <p:cNvPr id="59" name="Oval 13"/>
+          <p:cNvSpPr>
+            <a:spLocks noChangeArrowheads="1"/>
+          </p:cNvSpPr>
+          <p:nvPr/>
+        </p:nvSpPr>
+        <p:spPr bwMode="auto">
+          <a:xfrm>
+            <a:off x="298930" y="6152200"/>
+            <a:ext cx="1149590" cy="531005"/>
+          </a:xfrm>
+          <a:prstGeom prst="ellipse">
+            <a:avLst/>
+          </a:prstGeom>
+          <a:solidFill>
+            <a:srgbClr val="00FF00"/>
+          </a:solidFill>
+          <a:ln w="9525">
+            <a:solidFill>
+              <a:schemeClr val="tx1"/>
+            </a:solidFill>
+            <a:round/>
+            <a:headEnd/>
+            <a:tailEnd/>
+          </a:ln>
+        </p:spPr>
+        <p:txBody>
+          <a:bodyPr wrap="none" anchor="ctr">
+            <a:prstTxWarp prst="textNoShape">
+              <a:avLst/>
+            </a:prstTxWarp>
+          </a:bodyPr>
+          <a:lstStyle/>
+          <a:p>
+            <a:pPr algn="ctr" eaLnBrk="0" fontAlgn="base" hangingPunct="0">
+              <a:spcBef>
+                <a:spcPct val="0"/>
+              </a:spcBef>
+              <a:spcAft>
+                <a:spcPct val="0"/>
+              </a:spcAft>
+            </a:pPr>
+            <a:r>
+              <a:rPr lang="en-US" sz="1200" smtClean="0">
+                <a:solidFill>
+                  <a:srgbClr val="000000"/>
+                </a:solidFill>
+              </a:rPr>
+              <a:t>OffensivePosType</a:t>
+            </a:r>
+            <a:endParaRPr lang="en-US" sz="1200" dirty="0">
+              <a:solidFill>
+                <a:srgbClr val="000000"/>
+              </a:solidFill>
+            </a:endParaRPr>
+          </a:p>
+        </p:txBody>
+      </p:sp>
+      <p:sp>
+        <p:nvSpPr>
+          <p:cNvPr id="61" name="Oval 13"/>
+          <p:cNvSpPr>
+            <a:spLocks noChangeArrowheads="1"/>
+          </p:cNvSpPr>
+          <p:nvPr/>
+        </p:nvSpPr>
+        <p:spPr bwMode="auto">
+          <a:xfrm>
+            <a:off x="1969502" y="6073986"/>
+            <a:ext cx="1149590" cy="531005"/>
+          </a:xfrm>
+          <a:prstGeom prst="ellipse">
+            <a:avLst/>
+          </a:prstGeom>
+          <a:solidFill>
+            <a:srgbClr val="00FF00"/>
+          </a:solidFill>
+          <a:ln w="9525">
+            <a:solidFill>
+              <a:schemeClr val="tx1"/>
+            </a:solidFill>
+            <a:round/>
+            <a:headEnd/>
+            <a:tailEnd/>
+          </a:ln>
+        </p:spPr>
+        <p:txBody>
+          <a:bodyPr wrap="none" anchor="ctr">
+            <a:prstTxWarp prst="textNoShape">
+              <a:avLst/>
+            </a:prstTxWarp>
+          </a:bodyPr>
+          <a:lstStyle/>
+          <a:p>
+            <a:pPr algn="ctr" eaLnBrk="0" fontAlgn="base" hangingPunct="0">
+              <a:spcBef>
+                <a:spcPct val="0"/>
+              </a:spcBef>
+              <a:spcAft>
+                <a:spcPct val="0"/>
+              </a:spcAft>
+            </a:pPr>
+            <a:r>
+              <a:rPr lang="en-US" sz="1200" dirty="0" err="1" smtClean="0">
+                <a:solidFill>
+                  <a:srgbClr val="000000"/>
+                </a:solidFill>
+              </a:rPr>
+              <a:t>DefensivePosType</a:t>
+            </a:r>
+            <a:endParaRPr lang="en-US" sz="1200" dirty="0">
+              <a:solidFill>
+                <a:srgbClr val="000000"/>
+              </a:solidFill>
+            </a:endParaRPr>
+          </a:p>
+        </p:txBody>
+      </p:sp>
+    </p:spTree>
+    <p:extLst>
+      <p:ext uri="{BB962C8B-B14F-4D97-AF65-F5344CB8AC3E}">
+        <p14:creationId xmlns:p14="http://schemas.microsoft.com/office/powerpoint/2010/main" val="755702340"/>
+      </p:ext>
+    </p:extLst>
+  </p:cSld>
+  <p:clrMapOvr>
+    <a:masterClrMapping/>
+  </p:clrMapOvr>
+  <p:timing>
+    <p:tnLst>
+      <p:par>
+        <p:cTn xmlns:p14="http://schemas.microsoft.com/office/powerpoint/2010/main" id="1" dur="indefinite" restart="never" nodeType="tmRoot"/>
       </p:par>
     </p:tnLst>
   </p:timing>
@@ -28949,7 +32554,7 @@
   <a:extraClrSchemeLst/>
   <a:extLst>
     <a:ext uri="{05A4C25C-085E-4340-85A3-A5531E510DB2}">
-      <thm15:themeFamily xmlns="" xmlns:thm15="http://schemas.microsoft.com/office/thememl/2012/main" name="Office Theme" id="{62F939B6-93AF-4DB8-9C6B-D6C7DFDC589F}" vid="{4A3C46E8-61CC-4603-A589-7422A47A8E4A}"/>
+      <thm15:themeFamily xmlns:thm15="http://schemas.microsoft.com/office/thememl/2012/main" xmlns="" name="Office Theme" id="{62F939B6-93AF-4DB8-9C6B-D6C7DFDC589F}" vid="{4A3C46E8-61CC-4603-A589-7422A47A8E4A}"/>
     </a:ext>
   </a:extLst>
 </a:theme>
@@ -29210,7 +32815,7 @@
   <a:extraClrSchemeLst/>
   <a:extLst>
     <a:ext uri="{05A4C25C-085E-4340-85A3-A5531E510DB2}">
-      <thm15:themeFamily xmlns="" xmlns:thm15="http://schemas.microsoft.com/office/thememl/2012/main" name="Office Theme" id="{62F939B6-93AF-4DB8-9C6B-D6C7DFDC589F}" vid="{4A3C46E8-61CC-4603-A589-7422A47A8E4A}"/>
+      <thm15:themeFamily xmlns:thm15="http://schemas.microsoft.com/office/thememl/2012/main" xmlns="" name="Office Theme" id="{62F939B6-93AF-4DB8-9C6B-D6C7DFDC589F}" vid="{4A3C46E8-61CC-4603-A589-7422A47A8E4A}"/>
     </a:ext>
   </a:extLst>
 </a:theme>

</xml_diff>

<commit_message>
lec8 - updated material
</commit_message>
<xml_diff>
--- a/lectures/lecture-6-7-8/Lecture_8_ER.pptx
+++ b/lectures/lecture-6-7-8/Lecture_8_ER.pptx
@@ -135,7 +135,7 @@
   </p:defaultTextStyle>
   <p:extLst>
     <p:ext uri="{EFAFB233-063F-42B5-8137-9DF3F51BA10A}">
-      <p15:sldGuideLst xmlns:p15="http://schemas.microsoft.com/office/powerpoint/2012/main" xmlns="">
+      <p15:sldGuideLst xmlns="" xmlns:p15="http://schemas.microsoft.com/office/powerpoint/2012/main">
         <p15:guide id="1" orient="horz" pos="2160">
           <p15:clr>
             <a:srgbClr val="A4A3A4"/>
@@ -234,7 +234,7 @@
           <a:p>
             <a:fld id="{EC1B99DE-D43D-8F40-BB2B-C87FB37B3B64}" type="datetimeFigureOut">
               <a:rPr lang="en-US" smtClean="0"/>
-              <a:t>10/8/18</a:t>
+              <a:t>10/9/18</a:t>
             </a:fld>
             <a:endParaRPr lang="en-US"/>
           </a:p>
@@ -1059,7 +1059,7 @@
           <a:p>
             <a:fld id="{A5B1817B-4AAF-0040-9060-2F9962E6E12E}" type="datetimeFigureOut">
               <a:rPr lang="en-US" smtClean="0"/>
-              <a:t>10/8/18</a:t>
+              <a:t>10/9/18</a:t>
             </a:fld>
             <a:endParaRPr lang="en-US"/>
           </a:p>
@@ -1229,7 +1229,7 @@
           <a:p>
             <a:fld id="{A5B1817B-4AAF-0040-9060-2F9962E6E12E}" type="datetimeFigureOut">
               <a:rPr lang="en-US" smtClean="0"/>
-              <a:t>10/8/18</a:t>
+              <a:t>10/9/18</a:t>
             </a:fld>
             <a:endParaRPr lang="en-US"/>
           </a:p>
@@ -1409,7 +1409,7 @@
           <a:p>
             <a:fld id="{A5B1817B-4AAF-0040-9060-2F9962E6E12E}" type="datetimeFigureOut">
               <a:rPr lang="en-US" smtClean="0"/>
-              <a:t>10/8/18</a:t>
+              <a:t>10/9/18</a:t>
             </a:fld>
             <a:endParaRPr lang="en-US"/>
           </a:p>
@@ -1579,7 +1579,7 @@
           <a:p>
             <a:fld id="{A5B1817B-4AAF-0040-9060-2F9962E6E12E}" type="datetimeFigureOut">
               <a:rPr lang="en-US" smtClean="0"/>
-              <a:t>10/8/18</a:t>
+              <a:t>10/9/18</a:t>
             </a:fld>
             <a:endParaRPr lang="en-US"/>
           </a:p>
@@ -1825,7 +1825,7 @@
           <a:p>
             <a:fld id="{A5B1817B-4AAF-0040-9060-2F9962E6E12E}" type="datetimeFigureOut">
               <a:rPr lang="en-US" smtClean="0"/>
-              <a:t>10/8/18</a:t>
+              <a:t>10/9/18</a:t>
             </a:fld>
             <a:endParaRPr lang="en-US"/>
           </a:p>
@@ -2057,7 +2057,7 @@
           <a:p>
             <a:fld id="{A5B1817B-4AAF-0040-9060-2F9962E6E12E}" type="datetimeFigureOut">
               <a:rPr lang="en-US" smtClean="0"/>
-              <a:t>10/8/18</a:t>
+              <a:t>10/9/18</a:t>
             </a:fld>
             <a:endParaRPr lang="en-US"/>
           </a:p>
@@ -2424,7 +2424,7 @@
           <a:p>
             <a:fld id="{A5B1817B-4AAF-0040-9060-2F9962E6E12E}" type="datetimeFigureOut">
               <a:rPr lang="en-US" smtClean="0"/>
-              <a:t>10/8/18</a:t>
+              <a:t>10/9/18</a:t>
             </a:fld>
             <a:endParaRPr lang="en-US"/>
           </a:p>
@@ -2542,7 +2542,7 @@
           <a:p>
             <a:fld id="{A5B1817B-4AAF-0040-9060-2F9962E6E12E}" type="datetimeFigureOut">
               <a:rPr lang="en-US" smtClean="0"/>
-              <a:t>10/8/18</a:t>
+              <a:t>10/9/18</a:t>
             </a:fld>
             <a:endParaRPr lang="en-US"/>
           </a:p>
@@ -2637,7 +2637,7 @@
           <a:p>
             <a:fld id="{A5B1817B-4AAF-0040-9060-2F9962E6E12E}" type="datetimeFigureOut">
               <a:rPr lang="en-US" smtClean="0"/>
-              <a:t>10/8/18</a:t>
+              <a:t>10/9/18</a:t>
             </a:fld>
             <a:endParaRPr lang="en-US"/>
           </a:p>
@@ -2914,7 +2914,7 @@
           <a:p>
             <a:fld id="{A5B1817B-4AAF-0040-9060-2F9962E6E12E}" type="datetimeFigureOut">
               <a:rPr lang="en-US" smtClean="0"/>
-              <a:t>10/8/18</a:t>
+              <a:t>10/9/18</a:t>
             </a:fld>
             <a:endParaRPr lang="en-US"/>
           </a:p>
@@ -3167,7 +3167,7 @@
           <a:p>
             <a:fld id="{A5B1817B-4AAF-0040-9060-2F9962E6E12E}" type="datetimeFigureOut">
               <a:rPr lang="en-US" smtClean="0"/>
-              <a:t>10/8/18</a:t>
+              <a:t>10/9/18</a:t>
             </a:fld>
             <a:endParaRPr lang="en-US"/>
           </a:p>
@@ -3380,7 +3380,7 @@
           <a:p>
             <a:fld id="{A5B1817B-4AAF-0040-9060-2F9962E6E12E}" type="datetimeFigureOut">
               <a:rPr lang="en-US" smtClean="0"/>
-              <a:t>10/8/18</a:t>
+              <a:t>10/9/18</a:t>
             </a:fld>
             <a:endParaRPr lang="en-US"/>
           </a:p>
@@ -9427,7 +9427,7 @@
         <p:spPr bwMode="auto">
           <a:xfrm>
             <a:off x="905069" y="1524001"/>
-            <a:ext cx="10291666" cy="5262979"/>
+            <a:ext cx="10291666" cy="4524315"/>
           </a:xfrm>
           <a:prstGeom prst="rect">
             <a:avLst/>
@@ -9827,80 +9827,6 @@
               <a:buFont typeface="Arial" charset="0"/>
               <a:buChar char="•"/>
             </a:pPr>
-            <a:endParaRPr lang="en-US" sz="2400" i="1" dirty="0">
-              <a:solidFill>
-                <a:srgbClr val="000000"/>
-              </a:solidFill>
-            </a:endParaRPr>
-          </a:p>
-          <a:p>
-            <a:pPr marL="800100" lvl="1" indent="-342900" eaLnBrk="0" fontAlgn="base" hangingPunct="0">
-              <a:spcBef>
-                <a:spcPct val="0"/>
-              </a:spcBef>
-              <a:spcAft>
-                <a:spcPct val="0"/>
-              </a:spcAft>
-              <a:buFont typeface="Arial" charset="0"/>
-              <a:buChar char="•"/>
-            </a:pPr>
-            <a:r>
-              <a:rPr lang="en-US" sz="2400" u="sng" dirty="0" smtClean="0"/>
-              <a:t>Other </a:t>
-            </a:r>
-            <a:r>
-              <a:rPr lang="en-US" sz="2400" u="sng" dirty="0"/>
-              <a:t>constraints:</a:t>
-            </a:r>
-            <a:r>
-              <a:rPr lang="en-US" sz="2400" dirty="0">
-                <a:solidFill>
-                  <a:srgbClr val="000000"/>
-                </a:solidFill>
-              </a:rPr>
-              <a:t>  </a:t>
-            </a:r>
-            <a:endParaRPr lang="en-US" sz="2400" dirty="0" smtClean="0">
-              <a:solidFill>
-                <a:srgbClr val="000000"/>
-              </a:solidFill>
-            </a:endParaRPr>
-          </a:p>
-          <a:p>
-            <a:pPr marL="1257300" lvl="2" indent="-342900" eaLnBrk="0" fontAlgn="base" hangingPunct="0">
-              <a:spcBef>
-                <a:spcPct val="0"/>
-              </a:spcBef>
-              <a:spcAft>
-                <a:spcPct val="0"/>
-              </a:spcAft>
-              <a:buFont typeface="Arial" charset="0"/>
-              <a:buChar char="•"/>
-            </a:pPr>
-            <a:r>
-              <a:rPr lang="en-US" sz="2400" i="1" dirty="0" smtClean="0">
-                <a:solidFill>
-                  <a:srgbClr val="000000"/>
-                </a:solidFill>
-              </a:rPr>
-              <a:t>Ex: peoples</a:t>
-            </a:r>
-            <a:r>
-              <a:rPr lang="en-US" sz="2400" i="1" dirty="0">
-                <a:solidFill>
-                  <a:srgbClr val="000000"/>
-                </a:solidFill>
-              </a:rPr>
-              <a:t>’ ages are between 0 and </a:t>
-            </a:r>
-            <a:r>
-              <a:rPr lang="en-US" sz="2400" i="1" dirty="0" smtClean="0">
-                <a:solidFill>
-                  <a:srgbClr val="000000"/>
-                </a:solidFill>
-              </a:rPr>
-              <a:t>150</a:t>
-            </a:r>
             <a:endParaRPr lang="en-US" sz="2400" i="1" dirty="0">
               <a:solidFill>
                 <a:srgbClr val="000000"/>
@@ -10404,86 +10330,6 @@
                                         </p:cTn>
                                         <p:tgtEl>
                                           <p:spTgt spid="2"/>
-                                        </p:tgtEl>
-                                        <p:attrNameLst>
-                                          <p:attrName>style.visibility</p:attrName>
-                                        </p:attrNameLst>
-                                      </p:cBhvr>
-                                      <p:to>
-                                        <p:strVal val="visible"/>
-                                      </p:to>
-                                    </p:set>
-                                  </p:childTnLst>
-                                </p:cTn>
-                              </p:par>
-                            </p:childTnLst>
-                          </p:cTn>
-                        </p:par>
-                      </p:childTnLst>
-                    </p:cTn>
-                  </p:par>
-                  <p:par>
-                    <p:cTn id="29" fill="hold">
-                      <p:stCondLst>
-                        <p:cond delay="indefinite"/>
-                      </p:stCondLst>
-                      <p:childTnLst>
-                        <p:par>
-                          <p:cTn id="30" fill="hold">
-                            <p:stCondLst>
-                              <p:cond delay="0"/>
-                            </p:stCondLst>
-                            <p:childTnLst>
-                              <p:par>
-                                <p:cTn id="31" presetID="1" presetClass="entr" presetSubtype="0" fill="hold" nodeType="clickEffect">
-                                  <p:stCondLst>
-                                    <p:cond delay="0"/>
-                                  </p:stCondLst>
-                                  <p:childTnLst>
-                                    <p:set>
-                                      <p:cBhvr>
-                                        <p:cTn id="32" dur="1" fill="hold">
-                                          <p:stCondLst>
-                                            <p:cond delay="0"/>
-                                          </p:stCondLst>
-                                        </p:cTn>
-                                        <p:tgtEl>
-                                          <p:spTgt spid="59396">
-                                            <p:txEl>
-                                              <p:pRg st="11" end="11"/>
-                                            </p:txEl>
-                                          </p:spTgt>
-                                        </p:tgtEl>
-                                        <p:attrNameLst>
-                                          <p:attrName>style.visibility</p:attrName>
-                                        </p:attrNameLst>
-                                      </p:cBhvr>
-                                      <p:to>
-                                        <p:strVal val="visible"/>
-                                      </p:to>
-                                    </p:set>
-                                  </p:childTnLst>
-                                </p:cTn>
-                              </p:par>
-                              <p:par>
-                                <p:cTn id="33" presetID="1" presetClass="entr" presetSubtype="0" fill="hold" nodeType="withEffect">
-                                  <p:stCondLst>
-                                    <p:cond delay="0"/>
-                                  </p:stCondLst>
-                                  <p:childTnLst>
-                                    <p:set>
-                                      <p:cBhvr>
-                                        <p:cTn id="34" dur="1" fill="hold">
-                                          <p:stCondLst>
-                                            <p:cond delay="0"/>
-                                          </p:stCondLst>
-                                        </p:cTn>
-                                        <p:tgtEl>
-                                          <p:spTgt spid="59396">
-                                            <p:txEl>
-                                              <p:pRg st="12" end="12"/>
-                                            </p:txEl>
-                                          </p:spTgt>
                                         </p:tgtEl>
                                         <p:attrNameLst>
                                           <p:attrName>style.visibility</p:attrName>
@@ -18189,11 +18035,7 @@
           <a:p>
             <a:r>
               <a:rPr lang="en-US" dirty="0" smtClean="0"/>
-              <a:t>Extra </a:t>
-            </a:r>
-            <a:r>
-              <a:rPr lang="en-US" dirty="0" smtClean="0"/>
-              <a:t>Activity</a:t>
+              <a:t>Extra Activity</a:t>
             </a:r>
             <a:endParaRPr lang="en-US" dirty="0"/>
           </a:p>
@@ -18321,19 +18163,7 @@
                   </a:solidFill>
                   <a:latin typeface="+mj-lt"/>
                 </a:rPr>
-                <a:t>Lecture </a:t>
-              </a:r>
-              <a:r>
-                <a:rPr lang="en-US" sz="1400" b="1" i="1" dirty="0" smtClean="0">
-                  <a:solidFill>
-                    <a:schemeClr val="tx1">
-                      <a:lumMod val="65000"/>
-                      <a:lumOff val="35000"/>
-                    </a:schemeClr>
-                  </a:solidFill>
-                  <a:latin typeface="+mj-lt"/>
-                </a:rPr>
-                <a:t>8  </a:t>
+                <a:t>Lecture 8  </a:t>
               </a:r>
               <a:r>
                 <a:rPr lang="en-US" sz="1400" b="1" i="1" dirty="0">
@@ -18357,19 +18187,7 @@
                   </a:solidFill>
                   <a:latin typeface="+mj-lt"/>
                 </a:rPr>
-                <a:t>Section </a:t>
-              </a:r>
-              <a:r>
-                <a:rPr lang="en-US" sz="1400" b="1" i="1" dirty="0" smtClean="0">
-                  <a:solidFill>
-                    <a:schemeClr val="tx1">
-                      <a:lumMod val="65000"/>
-                      <a:lumOff val="35000"/>
-                    </a:schemeClr>
-                  </a:solidFill>
-                  <a:latin typeface="+mj-lt"/>
-                </a:rPr>
-                <a:t>1  </a:t>
+                <a:t>Section 1  </a:t>
               </a:r>
               <a:r>
                 <a:rPr lang="en-US" sz="1400" b="1" i="1" dirty="0">
@@ -18599,55 +18417,7 @@
                   </a:solidFill>
                   <a:latin typeface="+mj-lt"/>
                 </a:rPr>
-                <a:t>Lecture </a:t>
-              </a:r>
-              <a:r>
-                <a:rPr lang="en-US" sz="1400" b="1" i="1" dirty="0" smtClean="0">
-                  <a:solidFill>
-                    <a:schemeClr val="tx1">
-                      <a:lumMod val="65000"/>
-                      <a:lumOff val="35000"/>
-                    </a:schemeClr>
-                  </a:solidFill>
-                  <a:latin typeface="+mj-lt"/>
-                </a:rPr>
-                <a:t>8  </a:t>
-              </a:r>
-              <a:r>
-                <a:rPr lang="en-US" sz="1400" b="1" i="1" dirty="0" smtClean="0">
-                  <a:solidFill>
-                    <a:schemeClr val="tx1">
-                      <a:lumMod val="65000"/>
-                      <a:lumOff val="35000"/>
-                    </a:schemeClr>
-                  </a:solidFill>
-                  <a:latin typeface="+mj-lt"/>
-                </a:rPr>
-                <a:t>&gt;  Section  </a:t>
-              </a:r>
-              <a:r>
-                <a:rPr lang="en-US" sz="1400" b="1" i="1" dirty="0" smtClean="0">
-                  <a:solidFill>
-                    <a:schemeClr val="tx1">
-                      <a:lumMod val="65000"/>
-                      <a:lumOff val="35000"/>
-                    </a:schemeClr>
-                  </a:solidFill>
-                  <a:latin typeface="+mj-lt"/>
-                </a:rPr>
-                <a:t>1  </a:t>
-              </a:r>
-              <a:r>
-                <a:rPr lang="en-US" sz="1400" b="1" i="1" dirty="0" smtClean="0">
-                  <a:solidFill>
-                    <a:schemeClr val="tx1">
-                      <a:lumMod val="65000"/>
-                      <a:lumOff val="35000"/>
-                    </a:schemeClr>
-                  </a:solidFill>
-                  <a:latin typeface="+mj-lt"/>
-                </a:rPr>
-                <a:t>&gt;  ACTIVITY</a:t>
+                <a:t>Lecture 8  &gt;  Section  1  &gt;  ACTIVITY</a:t>
               </a:r>
               <a:endParaRPr lang="en-US" sz="1400" b="1" i="1" dirty="0">
                 <a:solidFill>
@@ -18734,13 +18504,7 @@
               <a:rPr lang="en-US" sz="2000" dirty="0" smtClean="0">
                 <a:latin typeface="+mj-lt"/>
               </a:rPr>
-              <a:t>Players are either on Offense or Defense, and are of types (QB, RB, WR, </a:t>
-            </a:r>
-            <a:r>
-              <a:rPr lang="en-US" sz="2000" dirty="0" smtClean="0">
-                <a:latin typeface="+mj-lt"/>
-              </a:rPr>
-              <a:t>TE)</a:t>
+              <a:t>Players are either on Offense or Defense, and are of types (QB, RB, WR, TE)</a:t>
             </a:r>
             <a:endParaRPr lang="en-US" sz="2000" dirty="0">
               <a:latin typeface="+mj-lt"/>
@@ -21313,14 +21077,14 @@
               </a:spcAft>
             </a:pPr>
             <a:r>
-              <a:rPr lang="en-US" sz="1200" u="sng" dirty="0" smtClean="0">
+              <a:rPr lang="en-US" sz="1200" dirty="0" smtClean="0">
                 <a:solidFill>
                   <a:srgbClr val="000000"/>
                 </a:solidFill>
               </a:rPr>
-              <a:t>String</a:t>
-            </a:r>
-            <a:endParaRPr lang="en-US" sz="1200" u="sng" dirty="0">
+              <a:t>Description</a:t>
+            </a:r>
+            <a:endParaRPr lang="en-US" sz="1200" dirty="0">
               <a:solidFill>
                 <a:srgbClr val="000000"/>
               </a:solidFill>
@@ -32554,7 +32318,7 @@
   <a:extraClrSchemeLst/>
   <a:extLst>
     <a:ext uri="{05A4C25C-085E-4340-85A3-A5531E510DB2}">
-      <thm15:themeFamily xmlns:thm15="http://schemas.microsoft.com/office/thememl/2012/main" xmlns="" name="Office Theme" id="{62F939B6-93AF-4DB8-9C6B-D6C7DFDC589F}" vid="{4A3C46E8-61CC-4603-A589-7422A47A8E4A}"/>
+      <thm15:themeFamily xmlns="" xmlns:thm15="http://schemas.microsoft.com/office/thememl/2012/main" name="Office Theme" id="{62F939B6-93AF-4DB8-9C6B-D6C7DFDC589F}" vid="{4A3C46E8-61CC-4603-A589-7422A47A8E4A}"/>
     </a:ext>
   </a:extLst>
 </a:theme>
@@ -32815,7 +32579,7 @@
   <a:extraClrSchemeLst/>
   <a:extLst>
     <a:ext uri="{05A4C25C-085E-4340-85A3-A5531E510DB2}">
-      <thm15:themeFamily xmlns:thm15="http://schemas.microsoft.com/office/thememl/2012/main" xmlns="" name="Office Theme" id="{62F939B6-93AF-4DB8-9C6B-D6C7DFDC589F}" vid="{4A3C46E8-61CC-4603-A589-7422A47A8E4A}"/>
+      <thm15:themeFamily xmlns="" xmlns:thm15="http://schemas.microsoft.com/office/thememl/2012/main" name="Office Theme" id="{62F939B6-93AF-4DB8-9C6B-D6C7DFDC589F}" vid="{4A3C46E8-61CC-4603-A589-7422A47A8E4A}"/>
     </a:ext>
   </a:extLst>
 </a:theme>

</xml_diff>